<commit_message>
Update MIPaC presentation title slide
Changed the title slide of the MIPaC Introduction presentation to better reflect recent updates. This includes a revised project name and updated date.
</commit_message>
<xml_diff>
--- a/(A)MIPaC Introduction.pptx
+++ b/(A)MIPaC Introduction.pptx
@@ -33983,10 +33983,9 @@
               <a:buNone/>
             </a:pPr>
             <a:r>
-              <a:rPr lang="en-US" sz="3200" dirty="0"/>
+              <a:rPr lang="en-GB" sz="3200" noProof="0" dirty="0"/>
               <a:t>Introduction to (Advanced) Multimedia Information Processing and Communications –  (A)MIPaC</a:t>
             </a:r>
-            <a:endParaRPr sz="3200" dirty="0"/>
           </a:p>
         </p:txBody>
       </p:sp>
@@ -34033,14 +34032,14 @@
               <a:buNone/>
             </a:pPr>
             <a:r>
-              <a:rPr lang="en-US" sz="1600">
+              <a:rPr lang="en-GB" sz="1600" noProof="0" dirty="0">
                 <a:solidFill>
                   <a:srgbClr val="808080"/>
                 </a:solidFill>
               </a:rPr>
               <a:t>Mikołaj Leszczuk, Jakub Nawała</a:t>
             </a:r>
-            <a:endParaRPr/>
+            <a:endParaRPr lang="en-GB" noProof="0" dirty="0"/>
           </a:p>
         </p:txBody>
       </p:sp>
@@ -34157,10 +34156,9 @@
               <a:buNone/>
             </a:pPr>
             <a:r>
-              <a:rPr lang="en-US" dirty="0"/>
+              <a:rPr lang="en-GB" noProof="0" dirty="0"/>
               <a:t>Basic Rules</a:t>
             </a:r>
-            <a:endParaRPr dirty="0"/>
           </a:p>
         </p:txBody>
       </p:sp>
@@ -34200,10 +34198,9 @@
               <a:buChar char="»"/>
             </a:pPr>
             <a:r>
-              <a:rPr lang="en-US" dirty="0"/>
+              <a:rPr lang="en-GB" noProof="0" dirty="0"/>
               <a:t>Each participant of the course is a pixel in the multimedia world</a:t>
             </a:r>
-            <a:endParaRPr dirty="0"/>
           </a:p>
           <a:p>
             <a:pPr marL="457200" lvl="0" indent="-457200" algn="l" rtl="0">
@@ -34217,10 +34214,9 @@
               <a:buChar char="»"/>
             </a:pPr>
             <a:r>
-              <a:rPr lang="en-US" dirty="0"/>
+              <a:rPr lang="en-GB" noProof="0" dirty="0"/>
               <a:t>The goal of the game is to become a full-fledged, breathtaking video</a:t>
             </a:r>
-            <a:endParaRPr dirty="0"/>
           </a:p>
           <a:p>
             <a:pPr marL="457200" lvl="0" indent="-457200" algn="l" rtl="0">
@@ -34234,10 +34230,9 @@
               <a:buChar char="»"/>
             </a:pPr>
             <a:r>
-              <a:rPr lang="en-US" dirty="0"/>
+              <a:rPr lang="en-GB" noProof="0" dirty="0"/>
               <a:t>You can conduct your development in many ways, but the full path looks like this...</a:t>
             </a:r>
-            <a:endParaRPr dirty="0"/>
           </a:p>
         </p:txBody>
       </p:sp>
@@ -34301,10 +34296,9 @@
               <a:buNone/>
             </a:pPr>
             <a:r>
-              <a:rPr lang="en-US"/>
+              <a:rPr lang="en-GB" noProof="0" dirty="0"/>
               <a:t>Attributes (Badges)</a:t>
             </a:r>
-            <a:endParaRPr/>
           </a:p>
         </p:txBody>
       </p:sp>
@@ -34350,18 +34344,13 @@
               <a:buChar char="»"/>
             </a:pPr>
             <a:r>
-              <a:rPr lang="en-US" sz="3000" b="1" dirty="0">
+              <a:rPr lang="en-GB" sz="3000" b="1" noProof="0" dirty="0">
                 <a:solidFill>
                   <a:srgbClr val="A71930"/>
                 </a:solidFill>
               </a:rPr>
               <a:t>Pixel (2.0)</a:t>
             </a:r>
-            <a:endParaRPr sz="3000" b="1" dirty="0">
-              <a:solidFill>
-                <a:srgbClr val="A71930"/>
-              </a:solidFill>
-            </a:endParaRPr>
           </a:p>
           <a:p>
             <a:pPr marL="457200" lvl="0" indent="-419100" algn="l" rtl="0">
@@ -34381,18 +34370,13 @@
               <a:buChar char="»"/>
             </a:pPr>
             <a:r>
-              <a:rPr lang="en-US" sz="3000" b="1" dirty="0">
+              <a:rPr lang="en-GB" sz="3000" b="1" noProof="0" dirty="0">
                 <a:solidFill>
                   <a:srgbClr val="00693C"/>
                 </a:solidFill>
               </a:rPr>
               <a:t>Grayscale image (3.0)</a:t>
             </a:r>
-            <a:endParaRPr sz="3000" b="1" dirty="0">
-              <a:solidFill>
-                <a:srgbClr val="00693C"/>
-              </a:solidFill>
-            </a:endParaRPr>
           </a:p>
           <a:p>
             <a:pPr marL="457200" lvl="0" indent="-419100" algn="l" rtl="0">
@@ -34412,18 +34396,13 @@
               <a:buChar char="»"/>
             </a:pPr>
             <a:r>
-              <a:rPr lang="en-US" sz="3000" b="1" dirty="0">
+              <a:rPr lang="en-GB" sz="3000" b="1" noProof="0" dirty="0">
                 <a:solidFill>
                   <a:srgbClr val="00693C"/>
                 </a:solidFill>
               </a:rPr>
               <a:t>RGB (Red Green Blue) image (3.5)</a:t>
             </a:r>
-            <a:endParaRPr sz="3000" b="1" dirty="0">
-              <a:solidFill>
-                <a:srgbClr val="00693C"/>
-              </a:solidFill>
-            </a:endParaRPr>
           </a:p>
           <a:p>
             <a:pPr marL="457200" lvl="0" indent="-419100" algn="l" rtl="0">
@@ -34443,18 +34422,13 @@
               <a:buChar char="»"/>
             </a:pPr>
             <a:r>
-              <a:rPr lang="en-US" sz="3000" b="1" dirty="0">
+              <a:rPr lang="en-GB" sz="3000" b="1" noProof="0" dirty="0">
                 <a:solidFill>
                   <a:srgbClr val="00693C"/>
                 </a:solidFill>
               </a:rPr>
               <a:t>WCG (Wide Color Gamut) image (4.0)</a:t>
             </a:r>
-            <a:endParaRPr sz="3000" b="1" dirty="0">
-              <a:solidFill>
-                <a:srgbClr val="00693C"/>
-              </a:solidFill>
-            </a:endParaRPr>
           </a:p>
           <a:p>
             <a:pPr marL="457200" lvl="0" indent="-419100" algn="l" rtl="0">
@@ -34474,18 +34448,13 @@
               <a:buChar char="»"/>
             </a:pPr>
             <a:r>
-              <a:rPr lang="en-US" sz="3000" b="1" dirty="0">
+              <a:rPr lang="en-GB" sz="3000" b="1" noProof="0" dirty="0">
                 <a:solidFill>
                   <a:srgbClr val="00693C"/>
                 </a:solidFill>
               </a:rPr>
               <a:t>WCG video (4.5)</a:t>
             </a:r>
-            <a:endParaRPr sz="3000" b="1" dirty="0">
-              <a:solidFill>
-                <a:srgbClr val="00693C"/>
-              </a:solidFill>
-            </a:endParaRPr>
           </a:p>
           <a:p>
             <a:pPr marL="457200" lvl="0" indent="-419100" algn="l" rtl="0">
@@ -34505,18 +34474,13 @@
               <a:buChar char="»"/>
             </a:pPr>
             <a:r>
-              <a:rPr lang="en-US" sz="3000" b="1" dirty="0">
+              <a:rPr lang="en-GB" sz="3000" b="1" noProof="0" dirty="0">
                 <a:solidFill>
                   <a:srgbClr val="00693C"/>
                 </a:solidFill>
               </a:rPr>
               <a:t>VR WCG video (5.0)</a:t>
             </a:r>
-            <a:endParaRPr sz="3000" b="1" dirty="0">
-              <a:solidFill>
-                <a:srgbClr val="00693C"/>
-              </a:solidFill>
-            </a:endParaRPr>
           </a:p>
         </p:txBody>
       </p:sp>
@@ -34580,25 +34544,16 @@
               <a:buNone/>
             </a:pPr>
             <a:r>
-              <a:rPr lang="en-US" sz="3600" dirty="0"/>
+              <a:rPr lang="en-GB" sz="3600" noProof="0" dirty="0"/>
               <a:t>Development from Pixel to Video</a:t>
             </a:r>
             <a:br>
-              <a:rPr lang="en-US" sz="3600" dirty="0"/>
+              <a:rPr lang="en-GB" sz="3600" noProof="0" dirty="0"/>
             </a:br>
             <a:r>
-              <a:rPr lang="en-US" sz="3600" dirty="0"/>
-              <a:t>(MIPaC/</a:t>
+              <a:rPr lang="en-GB" sz="3600" noProof="0" dirty="0"/>
+              <a:t>(MIPaC/AMIPaC)</a:t>
             </a:r>
-            <a:r>
-              <a:rPr lang="en-US" sz="3600" dirty="0" err="1"/>
-              <a:t>AMIPaC</a:t>
-            </a:r>
-            <a:r>
-              <a:rPr lang="en-US" sz="3600" dirty="0"/>
-              <a:t>)</a:t>
-            </a:r>
-            <a:endParaRPr sz="3600" dirty="0"/>
           </a:p>
         </p:txBody>
       </p:sp>
@@ -34641,11 +34596,11 @@
               <a:buChar char="»"/>
             </a:pPr>
             <a:r>
-              <a:rPr lang="en-US" sz="3000" dirty="0"/>
+              <a:rPr lang="en-GB" sz="3000" noProof="0" dirty="0"/>
               <a:t>Class/talk attendance (</a:t>
             </a:r>
             <a:r>
-              <a:rPr lang="en-US" sz="3000" dirty="0">
+              <a:rPr lang="en-GB" sz="3000" noProof="0" dirty="0">
                 <a:highlight>
                   <a:srgbClr val="FFFF00"/>
                 </a:highlight>
@@ -34653,30 +34608,30 @@
               <a:t>mark it!) </a:t>
             </a:r>
             <a:r>
-              <a:rPr lang="en-US" sz="3000" dirty="0"/>
+              <a:rPr lang="en-GB" sz="3000" noProof="0" dirty="0"/>
               <a:t>→ </a:t>
             </a:r>
             <a:br>
-              <a:rPr lang="en-US" sz="3000" dirty="0"/>
+              <a:rPr lang="en-GB" sz="3000" noProof="0" dirty="0"/>
             </a:br>
             <a:r>
-              <a:rPr lang="en-US" sz="3000" b="1" dirty="0"/>
+              <a:rPr lang="en-GB" sz="3000" b="1" noProof="0" dirty="0"/>
               <a:t>1</a:t>
             </a:r>
             <a:r>
-              <a:rPr lang="en-US" sz="3000" dirty="0"/>
+              <a:rPr lang="en-GB" sz="3000" noProof="0" dirty="0"/>
               <a:t> </a:t>
             </a:r>
             <a:r>
-              <a:rPr lang="en-US" sz="3000" b="1" dirty="0"/>
+              <a:rPr lang="en-GB" sz="3000" b="1" noProof="0" dirty="0"/>
               <a:t>K</a:t>
             </a:r>
             <a:r>
-              <a:rPr lang="en-US" sz="3000" dirty="0"/>
+              <a:rPr lang="en-GB" sz="3000" noProof="0" dirty="0"/>
               <a:t>nowledge point (max. </a:t>
             </a:r>
             <a:r>
-              <a:rPr lang="en-US" sz="3000" b="1" dirty="0">
+              <a:rPr lang="en-GB" sz="3000" b="1" noProof="0" dirty="0">
                 <a:solidFill>
                   <a:schemeClr val="dk1"/>
                 </a:solidFill>
@@ -34684,15 +34639,15 @@
               <a:t>8</a:t>
             </a:r>
             <a:r>
-              <a:rPr lang="en-US" sz="3000" dirty="0"/>
+              <a:rPr lang="en-GB" sz="3000" noProof="0" dirty="0"/>
               <a:t>/</a:t>
             </a:r>
             <a:r>
-              <a:rPr lang="en-US" sz="3000" b="1" dirty="0"/>
-              <a:t>16</a:t>
+              <a:rPr lang="en-GB" sz="3000" b="1" noProof="0" dirty="0"/>
+              <a:t>18</a:t>
             </a:r>
             <a:r>
-              <a:rPr lang="en-US" sz="3000" dirty="0"/>
+              <a:rPr lang="en-GB" sz="3000" noProof="0" dirty="0"/>
               <a:t>)</a:t>
             </a:r>
           </a:p>
@@ -34711,18 +34666,18 @@
               <a:buChar char="»"/>
             </a:pPr>
             <a:r>
-              <a:rPr lang="en-US" sz="3000" dirty="0"/>
+              <a:rPr lang="en-GB" sz="3000" noProof="0" dirty="0"/>
               <a:t>Report submission → </a:t>
             </a:r>
             <a:br>
-              <a:rPr lang="en-US" sz="3000" dirty="0"/>
+              <a:rPr lang="en-GB" sz="3000" noProof="0" dirty="0"/>
             </a:br>
             <a:r>
-              <a:rPr lang="en-US" sz="3000" b="1" dirty="0"/>
+              <a:rPr lang="en-GB" sz="3000" b="1" noProof="0" dirty="0"/>
               <a:t>4</a:t>
             </a:r>
             <a:r>
-              <a:rPr lang="en-US" sz="3000" dirty="0">
+              <a:rPr lang="en-GB" sz="3000" noProof="0" dirty="0">
                 <a:solidFill>
                   <a:schemeClr val="dk1"/>
                 </a:solidFill>
@@ -34730,7 +34685,7 @@
               <a:t> </a:t>
             </a:r>
             <a:r>
-              <a:rPr lang="en-US" sz="3000" b="1" dirty="0">
+              <a:rPr lang="en-GB" sz="3000" b="1" noProof="0" dirty="0">
                 <a:solidFill>
                   <a:schemeClr val="dk1"/>
                 </a:solidFill>
@@ -34738,7 +34693,7 @@
               <a:t>P</a:t>
             </a:r>
             <a:r>
-              <a:rPr lang="en-US" sz="3000" dirty="0">
+              <a:rPr lang="en-GB" sz="3000" noProof="0" dirty="0">
                 <a:solidFill>
                   <a:schemeClr val="dk1"/>
                 </a:solidFill>
@@ -34746,7 +34701,7 @@
               <a:t>ractice points (max. </a:t>
             </a:r>
             <a:r>
-              <a:rPr lang="en-US" sz="3000" b="1" dirty="0">
+              <a:rPr lang="en-GB" sz="3000" b="1" noProof="0" dirty="0">
                 <a:solidFill>
                   <a:schemeClr val="dk1"/>
                 </a:solidFill>
@@ -34754,7 +34709,7 @@
               <a:t>32</a:t>
             </a:r>
             <a:r>
-              <a:rPr lang="en-US" sz="3000" dirty="0">
+              <a:rPr lang="en-GB" sz="3000" noProof="0" dirty="0">
                 <a:solidFill>
                   <a:schemeClr val="dk1"/>
                 </a:solidFill>
@@ -34762,15 +34717,15 @@
               <a:t>/</a:t>
             </a:r>
             <a:r>
-              <a:rPr lang="en-US" sz="3000" b="1" dirty="0">
+              <a:rPr lang="en-GB" sz="3000" b="1" dirty="0">
                 <a:solidFill>
                   <a:schemeClr val="dk1"/>
                 </a:solidFill>
               </a:rPr>
-              <a:t>64</a:t>
+              <a:t>72</a:t>
             </a:r>
             <a:r>
-              <a:rPr lang="en-US" sz="3000" dirty="0">
+              <a:rPr lang="en-GB" sz="3000" noProof="0" dirty="0">
                 <a:solidFill>
                   <a:schemeClr val="dk1"/>
                 </a:solidFill>
@@ -34796,7 +34751,7 @@
               <a:buChar char="»"/>
             </a:pPr>
             <a:r>
-              <a:rPr lang="en-US" sz="3000" dirty="0">
+              <a:rPr lang="en-GB" sz="3000" noProof="0" dirty="0">
                 <a:solidFill>
                   <a:schemeClr val="dk1"/>
                 </a:solidFill>
@@ -34804,14 +34759,14 @@
               <a:t>Supplemental exercises → </a:t>
             </a:r>
             <a:br>
-              <a:rPr lang="en-US" sz="3000" dirty="0">
+              <a:rPr lang="en-GB" sz="3000" noProof="0" dirty="0">
                 <a:solidFill>
                   <a:schemeClr val="dk1"/>
                 </a:solidFill>
               </a:rPr>
             </a:br>
             <a:r>
-              <a:rPr lang="en-US" sz="3000" b="1" dirty="0">
+              <a:rPr lang="en-GB" sz="3000" b="1" noProof="0" dirty="0">
                 <a:solidFill>
                   <a:schemeClr val="dk1"/>
                 </a:solidFill>
@@ -34819,7 +34774,7 @@
               <a:t>S</a:t>
             </a:r>
             <a:r>
-              <a:rPr lang="en-US" sz="3000" dirty="0">
+              <a:rPr lang="en-GB" sz="3000" noProof="0" dirty="0">
                 <a:solidFill>
                   <a:schemeClr val="dk1"/>
                 </a:solidFill>
@@ -34827,7 +34782,7 @@
               <a:t>kill points (max. </a:t>
             </a:r>
             <a:r>
-              <a:rPr lang="en-US" sz="3000" b="1" dirty="0">
+              <a:rPr lang="en-GB" sz="3000" b="1" noProof="0" dirty="0">
                 <a:solidFill>
                   <a:schemeClr val="dk1"/>
                 </a:solidFill>
@@ -34835,7 +34790,7 @@
               <a:t>18</a:t>
             </a:r>
             <a:r>
-              <a:rPr lang="en-US" sz="3000" dirty="0">
+              <a:rPr lang="en-GB" sz="3000" noProof="0" dirty="0">
                 <a:solidFill>
                   <a:schemeClr val="dk1"/>
                 </a:solidFill>
@@ -34843,7 +34798,7 @@
               <a:t>/</a:t>
             </a:r>
             <a:r>
-              <a:rPr lang="en-US" sz="3000" b="1" dirty="0">
+              <a:rPr lang="en-GB" sz="3000" b="1" noProof="0" dirty="0">
                 <a:solidFill>
                   <a:schemeClr val="dk1"/>
                 </a:solidFill>
@@ -34851,7 +34806,7 @@
               <a:t>36</a:t>
             </a:r>
             <a:r>
-              <a:rPr lang="en-US" sz="3000" dirty="0">
+              <a:rPr lang="en-GB" sz="3000" noProof="0" dirty="0">
                 <a:solidFill>
                   <a:schemeClr val="dk1"/>
                 </a:solidFill>
@@ -34877,7 +34832,7 @@
               <a:buChar char="»"/>
             </a:pPr>
             <a:r>
-              <a:rPr lang="en-US" sz="3000" dirty="0">
+              <a:rPr lang="en-GB" sz="3000" noProof="0" dirty="0">
                 <a:solidFill>
                   <a:schemeClr val="dk1"/>
                 </a:solidFill>
@@ -34885,14 +34840,14 @@
               <a:t>Quiz → </a:t>
             </a:r>
             <a:br>
-              <a:rPr lang="en-US" sz="3000" dirty="0">
+              <a:rPr lang="en-GB" sz="3000" noProof="0" dirty="0">
                 <a:solidFill>
                   <a:schemeClr val="dk1"/>
                 </a:solidFill>
               </a:rPr>
             </a:br>
             <a:r>
-              <a:rPr lang="en-US" sz="3000" b="1" dirty="0">
+              <a:rPr lang="en-GB" sz="3000" b="1" noProof="0" dirty="0">
                 <a:solidFill>
                   <a:schemeClr val="dk1"/>
                 </a:solidFill>
@@ -34900,7 +34855,7 @@
               <a:t>40</a:t>
             </a:r>
             <a:r>
-              <a:rPr lang="en-US" sz="3000" dirty="0">
+              <a:rPr lang="en-GB" sz="3000" noProof="0" dirty="0">
                 <a:solidFill>
                   <a:schemeClr val="dk1"/>
                 </a:solidFill>
@@ -34908,7 +34863,7 @@
               <a:t> </a:t>
             </a:r>
             <a:r>
-              <a:rPr lang="en-US" sz="3000" b="1" dirty="0">
+              <a:rPr lang="en-GB" sz="3000" b="1" noProof="0" dirty="0">
                 <a:solidFill>
                   <a:schemeClr val="dk1"/>
                 </a:solidFill>
@@ -34916,7 +34871,7 @@
               <a:t>T</a:t>
             </a:r>
             <a:r>
-              <a:rPr lang="en-US" sz="3000" dirty="0">
+              <a:rPr lang="en-GB" sz="3000" noProof="0" dirty="0">
                 <a:solidFill>
                   <a:schemeClr val="dk1"/>
                 </a:solidFill>
@@ -34924,7 +34879,7 @@
               <a:t>est points (max. </a:t>
             </a:r>
             <a:r>
-              <a:rPr lang="en-US" sz="3000" b="1" dirty="0">
+              <a:rPr lang="en-GB" sz="3000" b="1" noProof="0" dirty="0">
                 <a:solidFill>
                   <a:schemeClr val="dk1"/>
                 </a:solidFill>
@@ -34932,7 +34887,7 @@
               <a:t>40</a:t>
             </a:r>
             <a:r>
-              <a:rPr lang="en-US" sz="3000" dirty="0">
+              <a:rPr lang="en-GB" sz="3000" noProof="0" dirty="0">
                 <a:solidFill>
                   <a:schemeClr val="dk1"/>
                 </a:solidFill>
@@ -34940,7 +34895,7 @@
               <a:t>/</a:t>
             </a:r>
             <a:r>
-              <a:rPr lang="en-US" sz="3000" b="1" dirty="0">
+              <a:rPr lang="en-GB" sz="3000" b="1" noProof="0" dirty="0">
                 <a:solidFill>
                   <a:schemeClr val="dk1"/>
                 </a:solidFill>
@@ -34948,14 +34903,14 @@
               <a:t>80</a:t>
             </a:r>
             <a:r>
-              <a:rPr lang="en-US" sz="3000" dirty="0">
+              <a:rPr lang="en-GB" sz="3000" noProof="0" dirty="0">
                 <a:solidFill>
                   <a:schemeClr val="dk1"/>
                 </a:solidFill>
               </a:rPr>
               <a:t>)</a:t>
             </a:r>
-            <a:endParaRPr lang="en-US" sz="3000" b="1" dirty="0">
+            <a:endParaRPr lang="en-GB" sz="3000" b="1" noProof="0" dirty="0">
               <a:solidFill>
                 <a:srgbClr val="00693C"/>
               </a:solidFill>
@@ -35023,29 +34978,20 @@
               <a:buNone/>
             </a:pPr>
             <a:r>
-              <a:rPr lang="en-US" sz="3600" dirty="0"/>
+              <a:rPr lang="en-GB" sz="3600" noProof="0" dirty="0"/>
               <a:t>The </a:t>
             </a:r>
             <a:r>
-              <a:rPr lang="en-US" sz="3600" dirty="0" err="1"/>
+              <a:rPr lang="en-GB" sz="3600" noProof="0" dirty="0" err="1"/>
               <a:t>Sigmas</a:t>
             </a:r>
             <a:br>
-              <a:rPr lang="en-US" sz="3600" dirty="0"/>
+              <a:rPr lang="en-GB" sz="3600" noProof="0" dirty="0"/>
             </a:br>
             <a:r>
-              <a:rPr lang="en-US" sz="3600" dirty="0"/>
-              <a:t>(MIPaC/</a:t>
+              <a:rPr lang="en-GB" sz="3600" noProof="0" dirty="0"/>
+              <a:t>(MIPaC/AMIPaC)</a:t>
             </a:r>
-            <a:r>
-              <a:rPr lang="en-US" sz="3600" dirty="0" err="1"/>
-              <a:t>AMIPaC</a:t>
-            </a:r>
-            <a:r>
-              <a:rPr lang="en-US" sz="3600" dirty="0"/>
-              <a:t>)</a:t>
-            </a:r>
-            <a:endParaRPr sz="3600" dirty="0"/>
           </a:p>
         </p:txBody>
       </p:sp>
@@ -35080,15 +35026,23 @@
               </a:buClr>
             </a:pPr>
             <a:r>
-              <a:rPr lang="en-US" dirty="0">
+              <a:rPr lang="en-GB" noProof="0" dirty="0" err="1">
                 <a:solidFill>
                   <a:schemeClr val="dk1"/>
                 </a:solidFill>
               </a:rPr>
-              <a:t>Σ collectable (</a:t>
+              <a:t>Σ</a:t>
             </a:r>
             <a:r>
-              <a:rPr lang="en-US" b="1" dirty="0">
+              <a:rPr lang="en-GB" noProof="0" dirty="0">
+                <a:solidFill>
+                  <a:schemeClr val="dk1"/>
+                </a:solidFill>
+              </a:rPr>
+              <a:t> collectable (</a:t>
+            </a:r>
+            <a:r>
+              <a:rPr lang="en-GB" b="1" noProof="0" dirty="0">
                 <a:solidFill>
                   <a:schemeClr val="dk1"/>
                 </a:solidFill>
@@ -35096,7 +35050,7 @@
               <a:t>K</a:t>
             </a:r>
             <a:r>
-              <a:rPr lang="en-US" dirty="0">
+              <a:rPr lang="en-GB" noProof="0" dirty="0">
                 <a:solidFill>
                   <a:schemeClr val="dk1"/>
                 </a:solidFill>
@@ -35104,7 +35058,7 @@
               <a:t>nowledge, </a:t>
             </a:r>
             <a:r>
-              <a:rPr lang="en-US" b="1" dirty="0">
+              <a:rPr lang="en-GB" b="1" noProof="0" dirty="0">
                 <a:solidFill>
                   <a:schemeClr val="dk1"/>
                 </a:solidFill>
@@ -35112,7 +35066,7 @@
               <a:t>P</a:t>
             </a:r>
             <a:r>
-              <a:rPr lang="en-US" dirty="0">
+              <a:rPr lang="en-GB" noProof="0" dirty="0">
                 <a:solidFill>
                   <a:schemeClr val="dk1"/>
                 </a:solidFill>
@@ -35120,7 +35074,7 @@
               <a:t>ractice, </a:t>
             </a:r>
             <a:r>
-              <a:rPr lang="en-US" b="1" dirty="0">
+              <a:rPr lang="en-GB" b="1" noProof="0" dirty="0">
                 <a:solidFill>
                   <a:schemeClr val="dk1"/>
                 </a:solidFill>
@@ -35128,7 +35082,7 @@
               <a:t>S</a:t>
             </a:r>
             <a:r>
-              <a:rPr lang="en-US" dirty="0">
+              <a:rPr lang="en-GB" noProof="0" dirty="0">
                 <a:solidFill>
                   <a:schemeClr val="dk1"/>
                 </a:solidFill>
@@ -35136,7 +35090,7 @@
               <a:t>kill, </a:t>
             </a:r>
             <a:r>
-              <a:rPr lang="en-US" b="1" dirty="0">
+              <a:rPr lang="en-GB" b="1" noProof="0" dirty="0">
                 <a:solidFill>
                   <a:schemeClr val="dk1"/>
                 </a:solidFill>
@@ -35144,7 +35098,7 @@
               <a:t>T</a:t>
             </a:r>
             <a:r>
-              <a:rPr lang="en-US" dirty="0">
+              <a:rPr lang="en-GB" noProof="0" dirty="0">
                 <a:solidFill>
                   <a:schemeClr val="dk1"/>
                 </a:solidFill>
@@ -35152,7 +35106,7 @@
               <a:t>est) points = </a:t>
             </a:r>
             <a:r>
-              <a:rPr lang="en-US" b="1" dirty="0">
+              <a:rPr lang="en-GB" b="1" noProof="0" dirty="0">
                 <a:solidFill>
                   <a:schemeClr val="dk1"/>
                 </a:solidFill>
@@ -35160,7 +35114,7 @@
               <a:t>98</a:t>
             </a:r>
             <a:r>
-              <a:rPr lang="en-US" dirty="0">
+              <a:rPr lang="en-GB" noProof="0" dirty="0">
                 <a:solidFill>
                   <a:schemeClr val="dk1"/>
                 </a:solidFill>
@@ -35168,18 +35122,13 @@
               <a:t>/</a:t>
             </a:r>
             <a:r>
-              <a:rPr lang="en-US" b="1" dirty="0">
+              <a:rPr lang="en-GB" b="1" noProof="0" dirty="0">
                 <a:solidFill>
                   <a:schemeClr val="dk1"/>
                 </a:solidFill>
               </a:rPr>
-              <a:t>196</a:t>
+              <a:t>206</a:t>
             </a:r>
-            <a:endParaRPr b="1" dirty="0">
-              <a:solidFill>
-                <a:schemeClr val="dk1"/>
-              </a:solidFill>
-            </a:endParaRPr>
           </a:p>
           <a:p>
             <a:pPr marL="457200" lvl="0" indent="-457200" algn="l" rtl="0">
@@ -35199,7 +35148,7 @@
               <a:buChar char="»"/>
             </a:pPr>
             <a:r>
-              <a:rPr lang="en-US" dirty="0" err="1">
+              <a:rPr lang="en-GB" noProof="0" dirty="0" err="1">
                 <a:solidFill>
                   <a:schemeClr val="dk1"/>
                 </a:solidFill>
@@ -35207,18 +35156,13 @@
               <a:t>Σ</a:t>
             </a:r>
             <a:r>
-              <a:rPr lang="en-US" dirty="0">
+              <a:rPr lang="en-GB" noProof="0" dirty="0">
                 <a:solidFill>
                   <a:schemeClr val="dk1"/>
                 </a:solidFill>
               </a:rPr>
               <a:t> collected points → attribute:</a:t>
             </a:r>
-            <a:endParaRPr dirty="0">
-              <a:solidFill>
-                <a:schemeClr val="dk1"/>
-              </a:solidFill>
-            </a:endParaRPr>
           </a:p>
           <a:p>
             <a:pPr marL="914400" lvl="1" indent="-457200" algn="l" rtl="0">
@@ -35238,7 +35182,7 @@
               <a:buChar char="–"/>
             </a:pPr>
             <a:r>
-              <a:rPr lang="en-US" dirty="0">
+              <a:rPr lang="en-GB" noProof="0" dirty="0">
                 <a:solidFill>
                   <a:schemeClr val="dk1"/>
                 </a:solidFill>
@@ -35246,7 +35190,7 @@
               <a:t>According to the regulations of the </a:t>
             </a:r>
             <a:r>
-              <a:rPr lang="en-US" b="1" dirty="0">
+              <a:rPr lang="en-GB" b="1" noProof="0" dirty="0">
                 <a:solidFill>
                   <a:srgbClr val="00693C"/>
                 </a:solidFill>
@@ -35254,7 +35198,7 @@
               <a:t>A</a:t>
             </a:r>
             <a:r>
-              <a:rPr lang="en-US" b="1" dirty="0">
+              <a:rPr lang="en-GB" b="1" noProof="0" dirty="0">
                 <a:solidFill>
                   <a:schemeClr val="dk1"/>
                 </a:solidFill>
@@ -35262,7 +35206,7 @@
               <a:t>G</a:t>
             </a:r>
             <a:r>
-              <a:rPr lang="en-US" b="1" dirty="0">
+              <a:rPr lang="en-GB" b="1" noProof="0" dirty="0">
                 <a:solidFill>
                   <a:srgbClr val="A71930"/>
                 </a:solidFill>
@@ -35270,18 +35214,13 @@
               <a:t>H</a:t>
             </a:r>
             <a:r>
-              <a:rPr lang="en-US" dirty="0">
+              <a:rPr lang="en-GB" noProof="0" dirty="0">
                 <a:solidFill>
                   <a:schemeClr val="dk1"/>
                 </a:solidFill>
               </a:rPr>
               <a:t> studies</a:t>
             </a:r>
-            <a:endParaRPr dirty="0">
-              <a:solidFill>
-                <a:schemeClr val="dk1"/>
-              </a:solidFill>
-            </a:endParaRPr>
           </a:p>
           <a:p>
             <a:pPr marL="914400" lvl="1" indent="-457200" algn="l" rtl="0">
@@ -35301,14 +35240,14 @@
               <a:buChar char="–"/>
             </a:pPr>
             <a:r>
-              <a:rPr lang="en-US" b="1" dirty="0">
+              <a:rPr lang="en-GB" b="1" noProof="0" dirty="0">
                 <a:solidFill>
                   <a:srgbClr val="00693C"/>
                 </a:solidFill>
               </a:rPr>
-              <a:t>Assuming 80/160 → 100%</a:t>
+              <a:t>Assuming 80/168 → 100%</a:t>
             </a:r>
-            <a:endParaRPr b="1" dirty="0">
+            <a:endParaRPr lang="en-GB" b="1" noProof="0" dirty="0">
               <a:solidFill>
                 <a:srgbClr val="A71930"/>
               </a:solidFill>
@@ -35332,14 +35271,14 @@
               <a:buChar char="–"/>
             </a:pPr>
             <a:r>
-              <a:rPr lang="en-US" b="1" dirty="0">
+              <a:rPr lang="en-GB" b="1" noProof="0" dirty="0">
                 <a:solidFill>
                   <a:srgbClr val="A71930"/>
                 </a:solidFill>
               </a:rPr>
               <a:t>Test minimum 16/32</a:t>
             </a:r>
-            <a:endParaRPr b="1" dirty="0">
+            <a:endParaRPr lang="en-GB" b="1" noProof="0" dirty="0">
               <a:solidFill>
                 <a:srgbClr val="00693C"/>
               </a:solidFill>
@@ -35407,10 +35346,9 @@
               <a:buNone/>
             </a:pPr>
             <a:r>
-              <a:rPr lang="en-US"/>
+              <a:rPr lang="en-GB" noProof="0" dirty="0"/>
               <a:t>Attributes (Badges)</a:t>
             </a:r>
-            <a:endParaRPr/>
           </a:p>
         </p:txBody>
       </p:sp>
@@ -35449,18 +35387,13 @@
               <a:buSzPts val="3000"/>
             </a:pPr>
             <a:r>
-              <a:rPr lang="en-US" sz="2800" b="1" dirty="0">
+              <a:rPr lang="en-GB" sz="2800" b="1" noProof="0" dirty="0">
                 <a:solidFill>
                   <a:srgbClr val="A71930"/>
                 </a:solidFill>
               </a:rPr>
               <a:t>Pixel (2.0)</a:t>
             </a:r>
-            <a:endParaRPr sz="2800" b="1" dirty="0">
-              <a:solidFill>
-                <a:srgbClr val="A71930"/>
-              </a:solidFill>
-            </a:endParaRPr>
           </a:p>
           <a:p>
             <a:pPr marL="457200" lvl="0" indent="-419100" algn="l" rtl="0">
@@ -35480,18 +35413,13 @@
               <a:buChar char="»"/>
             </a:pPr>
             <a:r>
-              <a:rPr lang="en-US" sz="2800" b="1" dirty="0">
+              <a:rPr lang="en-GB" sz="2800" b="1" noProof="0" dirty="0">
                 <a:solidFill>
                   <a:srgbClr val="00693C"/>
                 </a:solidFill>
               </a:rPr>
               <a:t>Grayscale image (3.0): 50% → 41%</a:t>
             </a:r>
-            <a:endParaRPr sz="2800" b="1" dirty="0">
-              <a:solidFill>
-                <a:srgbClr val="00693C"/>
-              </a:solidFill>
-            </a:endParaRPr>
           </a:p>
           <a:p>
             <a:pPr marL="457200" lvl="0" indent="-419100" algn="l" rtl="0">
@@ -35511,18 +35439,13 @@
               <a:buChar char="»"/>
             </a:pPr>
             <a:r>
-              <a:rPr lang="en-US" sz="2800" b="1" dirty="0">
+              <a:rPr lang="en-GB" sz="2800" b="1" noProof="0" dirty="0">
                 <a:solidFill>
                   <a:srgbClr val="00693C"/>
                 </a:solidFill>
               </a:rPr>
               <a:t>RGB (Red Green Blue) image (3.5): 60% → 49%</a:t>
             </a:r>
-            <a:endParaRPr sz="2800" b="1" dirty="0">
-              <a:solidFill>
-                <a:srgbClr val="00693C"/>
-              </a:solidFill>
-            </a:endParaRPr>
           </a:p>
           <a:p>
             <a:pPr marL="457200" lvl="0" indent="-419100" algn="l" rtl="0">
@@ -35542,18 +35465,13 @@
               <a:buChar char="»"/>
             </a:pPr>
             <a:r>
-              <a:rPr lang="en-US" sz="2800" b="1" dirty="0">
+              <a:rPr lang="en-GB" sz="2800" b="1" noProof="0" dirty="0">
                 <a:solidFill>
                   <a:srgbClr val="00693C"/>
                 </a:solidFill>
               </a:rPr>
               <a:t>WCG (Wide Color Gamut) image (4.0): 70% → 57% </a:t>
             </a:r>
-            <a:endParaRPr sz="2800" b="1" dirty="0">
-              <a:solidFill>
-                <a:srgbClr val="00693C"/>
-              </a:solidFill>
-            </a:endParaRPr>
           </a:p>
           <a:p>
             <a:pPr marL="457200" lvl="0" indent="-419100" algn="l" rtl="0">
@@ -35573,18 +35491,13 @@
               <a:buChar char="»"/>
             </a:pPr>
             <a:r>
-              <a:rPr lang="en-US" sz="2800" b="1" dirty="0">
+              <a:rPr lang="en-GB" sz="2800" b="1" noProof="0" dirty="0">
                 <a:solidFill>
                   <a:srgbClr val="00693C"/>
                 </a:solidFill>
               </a:rPr>
               <a:t>WCG video (4.5): 80% → 65%</a:t>
             </a:r>
-            <a:endParaRPr sz="2800" b="1" dirty="0">
-              <a:solidFill>
-                <a:srgbClr val="00693C"/>
-              </a:solidFill>
-            </a:endParaRPr>
           </a:p>
           <a:p>
             <a:pPr marL="457200" lvl="0" indent="-419100" algn="l" rtl="0">
@@ -35604,18 +35517,13 @@
               <a:buChar char="»"/>
             </a:pPr>
             <a:r>
-              <a:rPr lang="en-US" sz="2800" b="1" dirty="0">
+              <a:rPr lang="en-GB" sz="2800" b="1" noProof="0" dirty="0">
                 <a:solidFill>
                   <a:srgbClr val="00693C"/>
                 </a:solidFill>
               </a:rPr>
               <a:t>VR WCG video (5.0): 90% → 74%</a:t>
             </a:r>
-            <a:endParaRPr sz="2800" b="1" dirty="0">
-              <a:solidFill>
-                <a:srgbClr val="00693C"/>
-              </a:solidFill>
-            </a:endParaRPr>
           </a:p>
         </p:txBody>
       </p:sp>
@@ -35684,10 +35592,9 @@
               <a:buNone/>
             </a:pPr>
             <a:r>
-              <a:rPr lang="pl-PL" dirty="0"/>
+              <a:rPr lang="en-GB" noProof="0" dirty="0"/>
               <a:t>Software</a:t>
             </a:r>
-            <a:endParaRPr lang="en-GB" dirty="0"/>
           </a:p>
         </p:txBody>
       </p:sp>
@@ -35725,7 +35632,7 @@
               </a:spcAft>
               <a:buNone/>
             </a:pPr>
-            <a:endParaRPr dirty="0"/>
+            <a:endParaRPr lang="en-GB" noProof="0" dirty="0"/>
           </a:p>
         </p:txBody>
       </p:sp>
@@ -35790,10 +35697,9 @@
               <a:buNone/>
             </a:pPr>
             <a:r>
-              <a:rPr lang="pl-PL" dirty="0"/>
+              <a:rPr lang="en-GB" noProof="0" dirty="0"/>
               <a:t>Software</a:t>
             </a:r>
-            <a:endParaRPr lang="en-GB" dirty="0"/>
           </a:p>
         </p:txBody>
       </p:sp>
@@ -35819,25 +35725,25 @@
           <a:lstStyle/>
           <a:p>
             <a:r>
-              <a:rPr lang="en-GB" dirty="0"/>
+              <a:rPr lang="en-GB" noProof="0" dirty="0"/>
               <a:t>Python + Jupyter</a:t>
             </a:r>
           </a:p>
           <a:p>
             <a:r>
-              <a:rPr lang="en-GB" dirty="0"/>
+              <a:rPr lang="en-GB" noProof="0" dirty="0"/>
               <a:t>MATLAB + Simulink</a:t>
             </a:r>
           </a:p>
           <a:p>
             <a:r>
-              <a:rPr lang="en-GB" dirty="0"/>
+              <a:rPr lang="en-GB" noProof="0" dirty="0"/>
               <a:t>VLC media player</a:t>
             </a:r>
           </a:p>
           <a:p>
             <a:r>
-              <a:rPr lang="en-GB" dirty="0"/>
+              <a:rPr lang="en-GB" noProof="0" dirty="0"/>
               <a:t>Software specific to a given exercise</a:t>
             </a:r>
           </a:p>
@@ -35908,10 +35814,9 @@
               <a:buNone/>
             </a:pPr>
             <a:r>
-              <a:rPr lang="en-US"/>
+              <a:rPr lang="en-GB" noProof="0" dirty="0"/>
               <a:t>Visit AGH Moodle (UPEL) to Track Your Progress</a:t>
             </a:r>
-            <a:endParaRPr/>
           </a:p>
         </p:txBody>
       </p:sp>
@@ -35949,7 +35854,7 @@
               </a:spcAft>
               <a:buNone/>
             </a:pPr>
-            <a:endParaRPr dirty="0"/>
+            <a:endParaRPr lang="en-GB" noProof="0" dirty="0"/>
           </a:p>
         </p:txBody>
       </p:sp>
@@ -36013,10 +35918,9 @@
               <a:buNone/>
             </a:pPr>
             <a:r>
-              <a:rPr lang="en-US"/>
+              <a:rPr lang="en-GB" noProof="0" dirty="0"/>
               <a:t>Thank You for Your Attention!</a:t>
             </a:r>
-            <a:endParaRPr/>
           </a:p>
         </p:txBody>
       </p:sp>
@@ -36054,7 +35958,7 @@
               </a:spcAft>
               <a:buNone/>
             </a:pPr>
-            <a:endParaRPr/>
+            <a:endParaRPr lang="en-GB" noProof="0" dirty="0"/>
           </a:p>
         </p:txBody>
       </p:sp>
@@ -36093,10 +35997,10 @@
               <a:buNone/>
             </a:pPr>
             <a:fld id="{00000000-1234-1234-1234-123412341234}" type="slidenum">
-              <a:rPr lang="en-US"/>
+              <a:rPr lang="en-GB" noProof="0" smtClean="0"/>
               <a:t>19</a:t>
             </a:fld>
-            <a:endParaRPr/>
+            <a:endParaRPr lang="en-GB" noProof="0" dirty="0"/>
           </a:p>
         </p:txBody>
       </p:sp>
@@ -36160,10 +36064,9 @@
               <a:buNone/>
             </a:pPr>
             <a:r>
-              <a:rPr lang="en-US"/>
+              <a:rPr lang="en-GB" noProof="0" dirty="0"/>
               <a:t>Module Summary</a:t>
             </a:r>
-            <a:endParaRPr/>
           </a:p>
         </p:txBody>
       </p:sp>
@@ -36201,7 +36104,7 @@
               </a:spcAft>
               <a:buNone/>
             </a:pPr>
-            <a:endParaRPr/>
+            <a:endParaRPr lang="en-GB" noProof="0" dirty="0"/>
           </a:p>
         </p:txBody>
       </p:sp>
@@ -36265,17 +36168,16 @@
               <a:buNone/>
             </a:pPr>
             <a:r>
-              <a:rPr lang="en-US"/>
+              <a:rPr lang="en-GB" noProof="0" dirty="0"/>
               <a:t>Announcements</a:t>
             </a:r>
             <a:br>
-              <a:rPr lang="en-US"/>
+              <a:rPr lang="en-GB" noProof="0" dirty="0"/>
             </a:br>
             <a:r>
-              <a:rPr lang="en-US"/>
+              <a:rPr lang="en-GB" noProof="0" dirty="0"/>
               <a:t>and Consultations Rules</a:t>
             </a:r>
-            <a:endParaRPr/>
           </a:p>
         </p:txBody>
       </p:sp>
@@ -36313,7 +36215,7 @@
               </a:buClr>
             </a:pPr>
             <a:r>
-              <a:rPr lang="en-US" sz="3200" dirty="0">
+              <a:rPr lang="en-GB" sz="3200" noProof="0" dirty="0">
                 <a:solidFill>
                   <a:schemeClr val="dk1"/>
                 </a:solidFill>
@@ -36321,7 +36223,7 @@
               <a:t>Microsoft Teams (use the code: </a:t>
             </a:r>
             <a:r>
-              <a:rPr lang="en-US" sz="3200" b="1" dirty="0" err="1">
+              <a:rPr lang="en-GB" sz="3200" b="1" noProof="0" dirty="0" err="1">
                 <a:solidFill>
                   <a:schemeClr val="dk1"/>
                 </a:solidFill>
@@ -36329,18 +36231,13 @@
               <a:t>txyjeye</a:t>
             </a:r>
             <a:r>
-              <a:rPr lang="en-US" sz="3200" dirty="0">
+              <a:rPr lang="en-GB" sz="3200" noProof="0" dirty="0">
                 <a:solidFill>
                   <a:schemeClr val="dk1"/>
                 </a:solidFill>
               </a:rPr>
               <a:t>)</a:t>
             </a:r>
-            <a:endParaRPr sz="3200" dirty="0">
-              <a:solidFill>
-                <a:schemeClr val="dk1"/>
-              </a:solidFill>
-            </a:endParaRPr>
           </a:p>
           <a:p>
             <a:pPr marL="457200" lvl="0" indent="-457200" algn="l" rtl="0">
@@ -36354,10 +36251,9 @@
               <a:buChar char="»"/>
             </a:pPr>
             <a:r>
-              <a:rPr lang="en-US" sz="3200" dirty="0"/>
+              <a:rPr lang="en-GB" sz="3200" noProof="0" dirty="0"/>
               <a:t>Using channels:</a:t>
             </a:r>
-            <a:endParaRPr sz="3200" dirty="0"/>
           </a:p>
           <a:p>
             <a:pPr marL="914400" lvl="1" indent="-457200" algn="l" rtl="0">
@@ -36371,10 +36267,9 @@
               <a:buChar char="–"/>
             </a:pPr>
             <a:r>
-              <a:rPr lang="en-US" sz="3200" dirty="0"/>
+              <a:rPr lang="en-GB" sz="3200" noProof="0" dirty="0"/>
               <a:t>General - general topics</a:t>
             </a:r>
-            <a:endParaRPr sz="3200" dirty="0"/>
           </a:p>
           <a:p>
             <a:pPr marL="914400" lvl="1" indent="-457200" algn="l" rtl="0">
@@ -36388,10 +36283,9 @@
               <a:buChar char="–"/>
             </a:pPr>
             <a:r>
-              <a:rPr lang="en-US" sz="3200" dirty="0"/>
+              <a:rPr lang="en-GB" sz="3200" noProof="0" dirty="0"/>
               <a:t>Random - chit-chats, jokes, etc.</a:t>
             </a:r>
-            <a:endParaRPr sz="3200" dirty="0"/>
           </a:p>
           <a:p>
             <a:pPr marL="914400" lvl="1" indent="-457200" algn="l" rtl="0">
@@ -36405,46 +36299,17 @@
               <a:buChar char="–"/>
             </a:pPr>
             <a:r>
-              <a:rPr lang="en-US" sz="3200" dirty="0"/>
-              <a:t>Course-year</a:t>
+              <a:rPr lang="en-GB" sz="3200" noProof="0" dirty="0"/>
+              <a:t>Course-year (e.g., </a:t>
             </a:r>
             <a:r>
-              <a:rPr lang="pl-PL" sz="3200" dirty="0"/>
-              <a:t> (</a:t>
-            </a:r>
-            <a:r>
-              <a:rPr lang="pl-PL" sz="3200" dirty="0" err="1"/>
-              <a:t>e.g</a:t>
-            </a:r>
-            <a:r>
-              <a:rPr lang="pl-PL" sz="3200" dirty="0"/>
-              <a:t>., </a:t>
-            </a:r>
-            <a:r>
-              <a:rPr lang="pl-PL" sz="3200" i="1" dirty="0"/>
+              <a:rPr lang="en-GB" sz="3200" i="1" noProof="0" dirty="0"/>
               <a:t>MIPaC-2021</a:t>
             </a:r>
             <a:r>
-              <a:rPr lang="pl-PL" sz="3200" dirty="0"/>
-              <a:t>)</a:t>
+              <a:rPr lang="en-GB" sz="3200" noProof="0" dirty="0"/>
+              <a:t>) – course related matters</a:t>
             </a:r>
-            <a:r>
-              <a:rPr lang="en-US" sz="3200" dirty="0"/>
-              <a:t> – course</a:t>
-            </a:r>
-            <a:r>
-              <a:rPr lang="pl-PL" sz="3200" dirty="0"/>
-              <a:t> </a:t>
-            </a:r>
-            <a:r>
-              <a:rPr lang="pl-PL" sz="3200" dirty="0" err="1"/>
-              <a:t>related</a:t>
-            </a:r>
-            <a:r>
-              <a:rPr lang="en-US" sz="3200" dirty="0"/>
-              <a:t> matters</a:t>
-            </a:r>
-            <a:endParaRPr sz="3200" dirty="0"/>
           </a:p>
           <a:p>
             <a:pPr marL="457200" lvl="0" indent="-457200" algn="l" rtl="0">
@@ -36458,10 +36323,9 @@
               <a:buChar char="»"/>
             </a:pPr>
             <a:r>
-              <a:rPr lang="en-US" sz="3200" dirty="0"/>
+              <a:rPr lang="en-GB" sz="3200" noProof="0" dirty="0"/>
               <a:t>Avoid direct messages in problem-solving - share the knowledge</a:t>
             </a:r>
-            <a:endParaRPr sz="3200" dirty="0"/>
           </a:p>
           <a:p>
             <a:pPr marL="457200" lvl="0" indent="-457200" algn="l" rtl="0">
@@ -36475,10 +36339,9 @@
               <a:buChar char="»"/>
             </a:pPr>
             <a:r>
-              <a:rPr lang="en-US" sz="3200" dirty="0"/>
+              <a:rPr lang="en-GB" sz="3200" noProof="0" dirty="0"/>
               <a:t>Use [Issue Titles] and threads</a:t>
             </a:r>
-            <a:endParaRPr sz="3200" dirty="0"/>
           </a:p>
         </p:txBody>
       </p:sp>
@@ -36542,10 +36405,9 @@
               <a:buNone/>
             </a:pPr>
             <a:r>
-              <a:rPr lang="en-US"/>
+              <a:rPr lang="en-GB" noProof="0" dirty="0"/>
               <a:t>Module Summary</a:t>
             </a:r>
-            <a:endParaRPr/>
           </a:p>
         </p:txBody>
       </p:sp>
@@ -36588,18 +36450,13 @@
               <a:buChar char="»"/>
             </a:pPr>
             <a:r>
-              <a:rPr lang="en-US" dirty="0">
+              <a:rPr lang="en-GB" noProof="0" dirty="0">
                 <a:solidFill>
                   <a:schemeClr val="dk1"/>
                 </a:solidFill>
               </a:rPr>
               <a:t>The course consists of:</a:t>
             </a:r>
-            <a:endParaRPr dirty="0">
-              <a:solidFill>
-                <a:schemeClr val="dk1"/>
-              </a:solidFill>
-            </a:endParaRPr>
           </a:p>
           <a:p>
             <a:pPr marL="914400" lvl="1" indent="-457200" algn="l" rtl="0">
@@ -36616,18 +36473,13 @@
               <a:buChar char="–"/>
             </a:pPr>
             <a:r>
-              <a:rPr lang="en-US" dirty="0">
+              <a:rPr lang="en-GB" noProof="0" dirty="0">
                 <a:solidFill>
                   <a:schemeClr val="dk1"/>
                 </a:solidFill>
               </a:rPr>
               <a:t>Computer exercises on multimedia (mainly image and video) data processing and transmission</a:t>
             </a:r>
-            <a:endParaRPr dirty="0">
-              <a:solidFill>
-                <a:schemeClr val="dk1"/>
-              </a:solidFill>
-            </a:endParaRPr>
           </a:p>
           <a:p>
             <a:pPr marL="914400" lvl="1" indent="-457200" algn="l" rtl="0">
@@ -36644,18 +36496,13 @@
               <a:buChar char="–"/>
             </a:pPr>
             <a:r>
-              <a:rPr lang="en-US" dirty="0">
+              <a:rPr lang="en-GB" noProof="0" dirty="0">
                 <a:solidFill>
                   <a:schemeClr val="dk1"/>
                 </a:solidFill>
               </a:rPr>
               <a:t>Micro-project (MIPaC only)</a:t>
             </a:r>
-            <a:endParaRPr dirty="0">
-              <a:solidFill>
-                <a:schemeClr val="dk1"/>
-              </a:solidFill>
-            </a:endParaRPr>
           </a:p>
           <a:p>
             <a:pPr marL="457200" lvl="0" indent="-457200" algn="l" rtl="0">
@@ -36669,10 +36516,9 @@
               <a:buChar char="»"/>
             </a:pPr>
             <a:r>
-              <a:rPr lang="en-US" dirty="0"/>
+              <a:rPr lang="en-GB" noProof="0" dirty="0"/>
               <a:t>Classes will be held at computers</a:t>
             </a:r>
-            <a:endParaRPr dirty="0"/>
           </a:p>
         </p:txBody>
       </p:sp>
@@ -36736,10 +36582,9 @@
               <a:buNone/>
             </a:pPr>
             <a:r>
-              <a:rPr lang="en-US"/>
+              <a:rPr lang="en-GB" noProof="0" dirty="0"/>
               <a:t>Teaching Resources</a:t>
             </a:r>
-            <a:endParaRPr/>
           </a:p>
         </p:txBody>
       </p:sp>
@@ -36778,12 +36623,12 @@
               <a:buNone/>
             </a:pPr>
             <a:r>
-              <a:rPr lang="en-GB" dirty="0">
+              <a:rPr lang="en-GB" noProof="0" dirty="0">
                 <a:hlinkClick r:id="rId3"/>
               </a:rPr>
               <a:t>University e-Learning Platform</a:t>
             </a:r>
-            <a:endParaRPr dirty="0"/>
+            <a:endParaRPr lang="en-GB" noProof="0" dirty="0"/>
           </a:p>
         </p:txBody>
       </p:sp>
@@ -36843,10 +36688,9 @@
               <a:buNone/>
             </a:pPr>
             <a:r>
-              <a:rPr lang="en-US" dirty="0"/>
+              <a:rPr lang="en-GB" noProof="0" dirty="0"/>
               <a:t>Contents of Teaching Resources</a:t>
             </a:r>
-            <a:endParaRPr dirty="0"/>
           </a:p>
         </p:txBody>
       </p:sp>
@@ -36877,7 +36721,7 @@
               </a:buClr>
             </a:pPr>
             <a:r>
-              <a:rPr lang="en-US" dirty="0"/>
+              <a:rPr lang="en-GB" noProof="0" dirty="0"/>
               <a:t>Communication platform, e.g., for announcements</a:t>
             </a:r>
           </a:p>
@@ -36888,7 +36732,7 @@
               </a:buClr>
             </a:pPr>
             <a:r>
-              <a:rPr lang="en-US" dirty="0">
+              <a:rPr lang="en-GB" noProof="0" dirty="0">
                 <a:solidFill>
                   <a:schemeClr val="dk1"/>
                 </a:solidFill>
@@ -36903,7 +36747,7 @@
               </a:buClr>
             </a:pPr>
             <a:r>
-              <a:rPr lang="en-US" dirty="0">
+              <a:rPr lang="en-GB" noProof="0" dirty="0">
                 <a:solidFill>
                   <a:schemeClr val="dk1"/>
                 </a:solidFill>
@@ -36926,7 +36770,7 @@
               <a:buChar char="–"/>
             </a:pPr>
             <a:r>
-              <a:rPr lang="en-US" dirty="0">
+              <a:rPr lang="en-GB" noProof="0" dirty="0">
                 <a:solidFill>
                   <a:schemeClr val="dk1"/>
                 </a:solidFill>
@@ -36949,7 +36793,7 @@
               <a:buChar char="–"/>
             </a:pPr>
             <a:r>
-              <a:rPr lang="en-US" dirty="0">
+              <a:rPr lang="en-GB" noProof="0" dirty="0">
                 <a:solidFill>
                   <a:schemeClr val="dk1"/>
                 </a:solidFill>
@@ -36972,7 +36816,7 @@
               <a:buChar char="–"/>
             </a:pPr>
             <a:r>
-              <a:rPr lang="en-US" dirty="0">
+              <a:rPr lang="en-GB" noProof="0" dirty="0">
                 <a:solidFill>
                   <a:schemeClr val="dk1"/>
                 </a:solidFill>
@@ -36995,7 +36839,7 @@
               <a:buChar char="–"/>
             </a:pPr>
             <a:r>
-              <a:rPr lang="en-US" dirty="0">
+              <a:rPr lang="en-GB" noProof="0" dirty="0">
                 <a:solidFill>
                   <a:schemeClr val="dk1"/>
                 </a:solidFill>
@@ -37018,7 +36862,7 @@
               <a:buChar char="–"/>
             </a:pPr>
             <a:r>
-              <a:rPr lang="en-US" dirty="0">
+              <a:rPr lang="en-GB" noProof="0" dirty="0">
                 <a:solidFill>
                   <a:schemeClr val="dk1"/>
                 </a:solidFill>
@@ -37093,10 +36937,9 @@
               <a:buNone/>
             </a:pPr>
             <a:r>
-              <a:rPr lang="en-US"/>
+              <a:rPr lang="en-GB" noProof="0" dirty="0"/>
               <a:t>Forms of Classes</a:t>
             </a:r>
-            <a:endParaRPr/>
           </a:p>
         </p:txBody>
       </p:sp>
@@ -37134,7 +36977,7 @@
               </a:spcAft>
               <a:buNone/>
             </a:pPr>
-            <a:endParaRPr/>
+            <a:endParaRPr lang="en-GB" noProof="0" dirty="0"/>
           </a:p>
         </p:txBody>
       </p:sp>
@@ -37198,10 +37041,9 @@
               <a:buNone/>
             </a:pPr>
             <a:r>
-              <a:rPr lang="en-US"/>
+              <a:rPr lang="en-GB" noProof="0" dirty="0"/>
               <a:t>Forms of Classes (1/2)</a:t>
             </a:r>
-            <a:endParaRPr/>
           </a:p>
         </p:txBody>
       </p:sp>
@@ -37241,26 +37083,9 @@
               <a:buChar char="»"/>
             </a:pPr>
             <a:r>
-              <a:rPr lang="en-US" sz="3000" dirty="0"/>
-              <a:t>Computer classes, each consisting of introductory talk, exercise</a:t>
+              <a:rPr lang="en-GB" sz="3000" noProof="0" dirty="0"/>
+              <a:t>Computer classes, each consisting of introductory talk, exercise, report submission (+ suppl. ex.):</a:t>
             </a:r>
-            <a:r>
-              <a:rPr lang="pl-PL" sz="3000" dirty="0"/>
-              <a:t>, report </a:t>
-            </a:r>
-            <a:r>
-              <a:rPr lang="pl-PL" sz="3000" dirty="0" err="1"/>
-              <a:t>submission</a:t>
-            </a:r>
-            <a:r>
-              <a:rPr lang="en-GB" sz="3000" dirty="0"/>
-              <a:t> (+ suppl. ex.)</a:t>
-            </a:r>
-            <a:r>
-              <a:rPr lang="en-US" sz="3000" dirty="0"/>
-              <a:t>:</a:t>
-            </a:r>
-            <a:endParaRPr sz="3000" dirty="0"/>
           </a:p>
           <a:p>
             <a:pPr marL="914400" lvl="1" indent="-419100" algn="l" rtl="0">
@@ -37274,18 +37099,18 @@
               <a:buChar char="–"/>
             </a:pPr>
             <a:r>
-              <a:rPr lang="en-US" sz="3000" dirty="0"/>
+              <a:rPr lang="en-GB" sz="3000" noProof="0" dirty="0"/>
               <a:t>MIPaC: </a:t>
             </a:r>
             <a:r>
-              <a:rPr lang="en-US" sz="3000" b="1" dirty="0">
+              <a:rPr lang="en-GB" sz="3000" b="1" noProof="0" dirty="0">
                 <a:solidFill>
                   <a:schemeClr val="dk1"/>
                 </a:solidFill>
               </a:rPr>
               <a:t>1⋅8×⇒8×</a:t>
             </a:r>
-            <a:endParaRPr sz="3000" dirty="0"/>
+            <a:endParaRPr lang="en-GB" sz="3000" noProof="0" dirty="0"/>
           </a:p>
           <a:p>
             <a:pPr marL="914400" lvl="1" indent="-419100" algn="l" rtl="0">
@@ -37299,22 +37124,18 @@
               <a:buChar char="–"/>
             </a:pPr>
             <a:r>
-              <a:rPr lang="en-US" sz="3000" dirty="0" err="1"/>
-              <a:t>AMIPaC</a:t>
+              <a:rPr lang="en-GB" sz="3000" noProof="0" dirty="0"/>
+              <a:t>AMIPaC: </a:t>
             </a:r>
             <a:r>
-              <a:rPr lang="en-US" sz="3000" dirty="0"/>
-              <a:t>: </a:t>
+              <a:rPr lang="en-GB" sz="3000" b="1" noProof="0" dirty="0">
+                <a:solidFill>
+                  <a:schemeClr val="dk1"/>
+                </a:solidFill>
+              </a:rPr>
+              <a:t>2⋅9×⇒18×</a:t>
             </a:r>
-            <a:r>
-              <a:rPr lang="en-US" sz="3000" b="1" dirty="0">
-                <a:solidFill>
-                  <a:schemeClr val="dk1"/>
-                </a:solidFill>
-              </a:rPr>
-              <a:t>2⋅8×⇒16×</a:t>
-            </a:r>
-            <a:endParaRPr sz="3000" dirty="0"/>
+            <a:endParaRPr lang="en-GB" sz="3000" noProof="0" dirty="0"/>
           </a:p>
           <a:p>
             <a:pPr marL="457200" lvl="0" indent="-419100" algn="l" rtl="0">
@@ -37328,10 +37149,9 @@
               <a:buChar char="»"/>
             </a:pPr>
             <a:r>
-              <a:rPr lang="en-US" sz="3000" dirty="0"/>
+              <a:rPr lang="en-GB" sz="3000" noProof="0" dirty="0"/>
               <a:t>Consultations:</a:t>
             </a:r>
-            <a:endParaRPr sz="3000" dirty="0"/>
           </a:p>
           <a:p>
             <a:pPr marL="914400" lvl="1" indent="-419100" algn="l" rtl="0">
@@ -37345,7 +37165,7 @@
               <a:buChar char="–"/>
             </a:pPr>
             <a:r>
-              <a:rPr lang="en-US" sz="3000" dirty="0">
+              <a:rPr lang="en-GB" sz="3000" noProof="0" dirty="0">
                 <a:solidFill>
                   <a:schemeClr val="dk1"/>
                 </a:solidFill>
@@ -37353,7 +37173,7 @@
               <a:t>On-duty: </a:t>
             </a:r>
             <a:r>
-              <a:rPr lang="en-US" sz="3000" b="1" dirty="0">
+              <a:rPr lang="en-GB" sz="3000" b="1" noProof="0" dirty="0">
                 <a:solidFill>
                   <a:schemeClr val="dk1"/>
                 </a:solidFill>
@@ -37361,18 +37181,13 @@
               <a:t>during class hours</a:t>
             </a:r>
             <a:r>
-              <a:rPr lang="en-US" sz="3000" dirty="0">
+              <a:rPr lang="en-GB" sz="3000" noProof="0" dirty="0">
                 <a:solidFill>
                   <a:schemeClr val="dk1"/>
                 </a:solidFill>
               </a:rPr>
               <a:t> (immediate response, full availability)</a:t>
             </a:r>
-            <a:endParaRPr sz="3000" dirty="0">
-              <a:solidFill>
-                <a:schemeClr val="dk1"/>
-              </a:solidFill>
-            </a:endParaRPr>
           </a:p>
           <a:p>
             <a:pPr marL="914400" lvl="1" indent="-419100" algn="l" rtl="0">
@@ -37389,7 +37204,7 @@
               <a:buChar char="–"/>
             </a:pPr>
             <a:r>
-              <a:rPr lang="en-US" sz="3000" dirty="0">
+              <a:rPr lang="en-GB" sz="3000" noProof="0" dirty="0">
                 <a:solidFill>
                   <a:schemeClr val="dk1"/>
                 </a:solidFill>
@@ -37397,7 +37212,7 @@
               <a:t>Off-duty: </a:t>
             </a:r>
             <a:r>
-              <a:rPr lang="en-US" sz="3000" b="1" dirty="0">
+              <a:rPr lang="en-GB" sz="3000" b="1" noProof="0" dirty="0">
                 <a:solidFill>
                   <a:schemeClr val="dk1"/>
                 </a:solidFill>
@@ -37405,14 +37220,14 @@
               <a:t>24/7 😉</a:t>
             </a:r>
             <a:r>
-              <a:rPr lang="en-US" sz="3000" dirty="0">
+              <a:rPr lang="en-GB" sz="3000" noProof="0" dirty="0">
                 <a:solidFill>
                   <a:schemeClr val="dk1"/>
                 </a:solidFill>
               </a:rPr>
               <a:t> (delayed responses possible, limited availability)</a:t>
             </a:r>
-            <a:endParaRPr sz="3000" dirty="0"/>
+            <a:endParaRPr lang="en-GB" sz="3000" noProof="0" dirty="0"/>
           </a:p>
         </p:txBody>
       </p:sp>
@@ -37476,10 +37291,9 @@
               <a:buNone/>
             </a:pPr>
             <a:r>
-              <a:rPr lang="en-US"/>
+              <a:rPr lang="en-GB" noProof="0" dirty="0"/>
               <a:t>Forms of Classes (2/2)</a:t>
             </a:r>
-            <a:endParaRPr/>
           </a:p>
         </p:txBody>
       </p:sp>
@@ -37519,14 +37333,9 @@
               <a:buChar char="»"/>
             </a:pPr>
             <a:r>
-              <a:rPr lang="en-GB" sz="3000" dirty="0"/>
-              <a:t>Supplemental exercises</a:t>
+              <a:rPr lang="en-GB" sz="3000" noProof="0" dirty="0"/>
+              <a:t>Supplemental exercises:</a:t>
             </a:r>
-            <a:r>
-              <a:rPr lang="en-US" sz="3000" dirty="0"/>
-              <a:t>:</a:t>
-            </a:r>
-            <a:endParaRPr sz="3000" dirty="0"/>
           </a:p>
           <a:p>
             <a:pPr marL="914400" lvl="1" indent="-419100" algn="l" rtl="0">
@@ -37543,7 +37352,7 @@
               <a:buChar char="–"/>
             </a:pPr>
             <a:r>
-              <a:rPr lang="en-US" sz="3000" dirty="0">
+              <a:rPr lang="en-GB" sz="3000" noProof="0" dirty="0">
                 <a:solidFill>
                   <a:schemeClr val="dk1"/>
                 </a:solidFill>
@@ -37551,14 +37360,14 @@
               <a:t>MIPaC: </a:t>
             </a:r>
             <a:r>
-              <a:rPr lang="en-US" sz="3000" b="1" dirty="0">
+              <a:rPr lang="en-GB" sz="3000" b="1" noProof="0" dirty="0">
                 <a:solidFill>
                   <a:schemeClr val="dk1"/>
                 </a:solidFill>
               </a:rPr>
               <a:t>3×</a:t>
             </a:r>
-            <a:endParaRPr sz="3000" dirty="0">
+            <a:endParaRPr lang="en-GB" sz="3000" noProof="0" dirty="0">
               <a:solidFill>
                 <a:schemeClr val="dk1"/>
               </a:solidFill>
@@ -37579,30 +37388,22 @@
               <a:buChar char="–"/>
             </a:pPr>
             <a:r>
-              <a:rPr lang="en-US" sz="3000" dirty="0" err="1">
+              <a:rPr lang="en-GB" sz="3000" noProof="0" dirty="0">
                 <a:solidFill>
                   <a:schemeClr val="dk1"/>
                 </a:solidFill>
               </a:rPr>
-              <a:t>AMIPaC</a:t>
+              <a:t>AMIPaC: </a:t>
             </a:r>
             <a:r>
-              <a:rPr lang="en-US" sz="3000" dirty="0">
-                <a:solidFill>
-                  <a:schemeClr val="dk1"/>
-                </a:solidFill>
-              </a:rPr>
-              <a:t>: </a:t>
-            </a:r>
-            <a:r>
-              <a:rPr lang="en-US" sz="3000" b="1" dirty="0">
+              <a:rPr lang="en-GB" sz="3000" b="1" noProof="0" dirty="0">
                 <a:solidFill>
                   <a:schemeClr val="dk1"/>
                 </a:solidFill>
               </a:rPr>
               <a:t>4×</a:t>
             </a:r>
-            <a:endParaRPr sz="3000" dirty="0"/>
+            <a:endParaRPr lang="en-GB" sz="3000" noProof="0" dirty="0"/>
           </a:p>
           <a:p>
             <a:pPr marL="457200" lvl="0" indent="-419100" algn="l" rtl="0">
@@ -37616,19 +37417,15 @@
               <a:buChar char="»"/>
             </a:pPr>
             <a:r>
-              <a:rPr lang="en-GB" sz="3000" dirty="0"/>
-              <a:t>Quizzes</a:t>
+              <a:rPr lang="en-GB" sz="3000" noProof="0" dirty="0"/>
+              <a:t>Quizzes (</a:t>
             </a:r>
             <a:r>
-              <a:rPr lang="en-US" sz="3000" dirty="0"/>
-              <a:t> (</a:t>
-            </a:r>
-            <a:r>
-              <a:rPr lang="en-US" sz="3000" b="1" dirty="0"/>
+              <a:rPr lang="en-GB" sz="3000" b="1" noProof="0" dirty="0"/>
               <a:t>2</a:t>
             </a:r>
             <a:r>
-              <a:rPr lang="en-US" sz="3000" b="1" dirty="0">
+              <a:rPr lang="en-GB" sz="3000" b="1" noProof="0" dirty="0">
                 <a:solidFill>
                   <a:schemeClr val="dk1"/>
                 </a:solidFill>
@@ -37636,10 +37433,9 @@
               <a:t>×</a:t>
             </a:r>
             <a:r>
-              <a:rPr lang="en-US" sz="3000" dirty="0"/>
+              <a:rPr lang="en-GB" sz="3000" noProof="0" dirty="0"/>
               <a:t>), scheduled individually:</a:t>
             </a:r>
-            <a:endParaRPr sz="3000" dirty="0"/>
           </a:p>
           <a:p>
             <a:pPr marL="914400" lvl="1" indent="-419100" algn="l" rtl="0">
@@ -37656,7 +37452,7 @@
               <a:buChar char="–"/>
             </a:pPr>
             <a:r>
-              <a:rPr lang="en-US" sz="3000" dirty="0">
+              <a:rPr lang="en-GB" sz="3000" noProof="0" dirty="0">
                 <a:solidFill>
                   <a:schemeClr val="dk1"/>
                 </a:solidFill>
@@ -37664,7 +37460,7 @@
               <a:t>MIPaC: </a:t>
             </a:r>
             <a:r>
-              <a:rPr lang="en-US" sz="3000" b="1" dirty="0">
+              <a:rPr lang="en-GB" sz="3000" b="1" noProof="0" dirty="0">
                 <a:solidFill>
                   <a:schemeClr val="dk1"/>
                 </a:solidFill>
@@ -37672,18 +37468,13 @@
               <a:t>1×</a:t>
             </a:r>
             <a:r>
-              <a:rPr lang="en-US" sz="3000" dirty="0">
+              <a:rPr lang="en-GB" sz="3000" noProof="0" dirty="0">
                 <a:solidFill>
                   <a:schemeClr val="dk1"/>
                 </a:solidFill>
               </a:rPr>
               <a:t> (final)</a:t>
             </a:r>
-            <a:endParaRPr sz="3000" dirty="0">
-              <a:solidFill>
-                <a:schemeClr val="dk1"/>
-              </a:solidFill>
-            </a:endParaRPr>
           </a:p>
           <a:p>
             <a:pPr marL="914400" lvl="1" indent="-419100" algn="l" rtl="0">
@@ -37700,23 +37491,15 @@
               <a:buChar char="–"/>
             </a:pPr>
             <a:r>
-              <a:rPr lang="en-US" sz="3000" dirty="0" err="1">
+              <a:rPr lang="en-GB" sz="3000" noProof="0" dirty="0">
                 <a:solidFill>
                   <a:schemeClr val="dk1"/>
                 </a:solidFill>
               </a:rPr>
-              <a:t>AMIPaC</a:t>
+              <a:t>AMIPaC: </a:t>
             </a:r>
             <a:r>
-              <a:rPr lang="en-US" sz="3000" dirty="0">
-                <a:solidFill>
-                  <a:schemeClr val="dk1"/>
-                </a:solidFill>
-              </a:rPr>
-              <a:t>: </a:t>
-            </a:r>
-            <a:r>
-              <a:rPr lang="en-US" sz="3000" b="1" dirty="0">
+              <a:rPr lang="en-GB" sz="3000" b="1" noProof="0" dirty="0">
                 <a:solidFill>
                   <a:schemeClr val="dk1"/>
                 </a:solidFill>
@@ -37724,14 +37507,14 @@
               <a:t>2×</a:t>
             </a:r>
             <a:r>
-              <a:rPr lang="en-US" sz="3000" dirty="0">
+              <a:rPr lang="en-GB" sz="3000" noProof="0" dirty="0">
                 <a:solidFill>
                   <a:schemeClr val="dk1"/>
                 </a:solidFill>
               </a:rPr>
               <a:t> (midterm, final)</a:t>
             </a:r>
-            <a:endParaRPr sz="3000" dirty="0"/>
+            <a:endParaRPr lang="en-GB" sz="3000" noProof="0" dirty="0"/>
           </a:p>
         </p:txBody>
       </p:sp>
@@ -37795,10 +37578,9 @@
               <a:buNone/>
             </a:pPr>
             <a:r>
-              <a:rPr lang="en-US" dirty="0"/>
+              <a:rPr lang="en-GB" noProof="0" dirty="0"/>
               <a:t>Method of Calculating the Final Grade</a:t>
             </a:r>
-            <a:endParaRPr dirty="0"/>
           </a:p>
         </p:txBody>
       </p:sp>
@@ -37836,7 +37618,7 @@
               </a:spcAft>
               <a:buNone/>
             </a:pPr>
-            <a:endParaRPr/>
+            <a:endParaRPr lang="en-GB" noProof="0" dirty="0"/>
           </a:p>
         </p:txBody>
       </p:sp>

</xml_diff>

<commit_message>
Refactor and update video compression resources
Streamlined the video compression notebook by reducing redundant content while maintaining key information. Added and updated related video and document references for a more comprehensive resource package.
</commit_message>
<xml_diff>
--- a/(A)MIPaC Introduction.pptx
+++ b/(A)MIPaC Introduction.pptx
@@ -7,7 +7,7 @@
     <p:sldMasterId id="2147483683" r:id="rId3"/>
   </p:sldMasterIdLst>
   <p:notesMasterIdLst>
-    <p:notesMasterId r:id="rId24"/>
+    <p:notesMasterId r:id="rId23"/>
   </p:notesMasterIdLst>
   <p:sldIdLst>
     <p:sldId id="256" r:id="rId4"/>
@@ -29,7 +29,6 @@
     <p:sldId id="275" r:id="rId20"/>
     <p:sldId id="271" r:id="rId21"/>
     <p:sldId id="272" r:id="rId22"/>
-    <p:sldId id="264" r:id="rId23"/>
   </p:sldIdLst>
   <p:sldSz cx="10680700" cy="7556500"/>
   <p:notesSz cx="6858000" cy="9144000"/>
@@ -2302,118 +2301,6 @@
               <a:buNone/>
             </a:pPr>
             <a:endParaRPr/>
-          </a:p>
-        </p:txBody>
-      </p:sp>
-    </p:spTree>
-  </p:cSld>
-  <p:clrMapOvr>
-    <a:masterClrMapping/>
-  </p:clrMapOvr>
-</p:notes>
-</file>
-
-<file path=ppt/notesSlides/notesSlide20.xml><?xml version="1.0" encoding="utf-8"?>
-<p:notes xmlns:a="http://schemas.openxmlformats.org/drawingml/2006/main" xmlns:r="http://schemas.openxmlformats.org/officeDocument/2006/relationships" xmlns:p="http://schemas.openxmlformats.org/presentationml/2006/main" showMasterSp="0" showMasterPhAnim="0">
-  <p:cSld>
-    <p:spTree>
-      <p:nvGrpSpPr>
-        <p:cNvPr id="1" name="Shape 205"/>
-        <p:cNvGrpSpPr/>
-        <p:nvPr/>
-      </p:nvGrpSpPr>
-      <p:grpSpPr>
-        <a:xfrm>
-          <a:off x="0" y="0"/>
-          <a:ext cx="0" cy="0"/>
-          <a:chOff x="0" y="0"/>
-          <a:chExt cx="0" cy="0"/>
-        </a:xfrm>
-      </p:grpSpPr>
-      <p:sp>
-        <p:nvSpPr>
-          <p:cNvPr id="206" name="Google Shape;206;g9d962b619b_0_27:notes"/>
-          <p:cNvSpPr>
-            <a:spLocks noGrp="1" noRot="1" noChangeAspect="1"/>
-          </p:cNvSpPr>
-          <p:nvPr>
-            <p:ph type="sldImg" idx="2"/>
-          </p:nvPr>
-        </p:nvSpPr>
-        <p:spPr>
-          <a:xfrm>
-            <a:off x="1006475" y="685800"/>
-            <a:ext cx="4845050" cy="3429000"/>
-          </a:xfrm>
-          <a:custGeom>
-            <a:avLst/>
-            <a:gdLst/>
-            <a:ahLst/>
-            <a:cxnLst/>
-            <a:rect l="l" t="t" r="r" b="b"/>
-            <a:pathLst>
-              <a:path w="120000" h="120000" extrusionOk="0">
-                <a:moveTo>
-                  <a:pt x="0" y="0"/>
-                </a:moveTo>
-                <a:lnTo>
-                  <a:pt x="120000" y="0"/>
-                </a:lnTo>
-                <a:lnTo>
-                  <a:pt x="120000" y="120000"/>
-                </a:lnTo>
-                <a:lnTo>
-                  <a:pt x="0" y="120000"/>
-                </a:lnTo>
-                <a:close/>
-              </a:path>
-            </a:pathLst>
-          </a:custGeom>
-        </p:spPr>
-      </p:sp>
-      <p:sp>
-        <p:nvSpPr>
-          <p:cNvPr id="207" name="Google Shape;207;g9d962b619b_0_27:notes"/>
-          <p:cNvSpPr txBox="1">
-            <a:spLocks noGrp="1"/>
-          </p:cNvSpPr>
-          <p:nvPr>
-            <p:ph type="body" idx="1"/>
-          </p:nvPr>
-        </p:nvSpPr>
-        <p:spPr>
-          <a:xfrm>
-            <a:off x="914400" y="4343400"/>
-            <a:ext cx="5029200" cy="4114800"/>
-          </a:xfrm>
-          <a:prstGeom prst="rect">
-            <a:avLst/>
-          </a:prstGeom>
-        </p:spPr>
-        <p:txBody>
-          <a:bodyPr spcFirstLastPara="1" wrap="square" lIns="91425" tIns="45700" rIns="91425" bIns="45700" anchor="t" anchorCtr="0">
-            <a:noAutofit/>
-          </a:bodyPr>
-          <a:lstStyle/>
-          <a:p>
-            <a:pPr marL="0" lvl="0" indent="0" algn="l" rtl="0">
-              <a:spcBef>
-                <a:spcPts val="0"/>
-              </a:spcBef>
-              <a:spcAft>
-                <a:spcPts val="0"/>
-              </a:spcAft>
-              <a:buNone/>
-            </a:pPr>
-            <a:r>
-              <a:rPr lang="pl-PL" dirty="0"/>
-              <a:t>Show</a:t>
-            </a:r>
-            <a:r>
-              <a:rPr lang="en-GB" dirty="0"/>
-              <a:t> how to properly start conversations in MS Teams.</a:t>
-            </a:r>
-            <a:endParaRPr dirty="0"/>
           </a:p>
         </p:txBody>
       </p:sp>
@@ -36116,243 +36003,6 @@
 </p:sld>
 </file>
 
-<file path=ppt/slides/slide20.xml><?xml version="1.0" encoding="utf-8"?>
-<p:sld xmlns:a="http://schemas.openxmlformats.org/drawingml/2006/main" xmlns:r="http://schemas.openxmlformats.org/officeDocument/2006/relationships" xmlns:p="http://schemas.openxmlformats.org/presentationml/2006/main" show="0">
-  <p:cSld>
-    <p:spTree>
-      <p:nvGrpSpPr>
-        <p:cNvPr id="1" name="Shape 208"/>
-        <p:cNvGrpSpPr/>
-        <p:nvPr/>
-      </p:nvGrpSpPr>
-      <p:grpSpPr>
-        <a:xfrm>
-          <a:off x="0" y="0"/>
-          <a:ext cx="0" cy="0"/>
-          <a:chOff x="0" y="0"/>
-          <a:chExt cx="0" cy="0"/>
-        </a:xfrm>
-      </p:grpSpPr>
-      <p:sp>
-        <p:nvSpPr>
-          <p:cNvPr id="209" name="Google Shape;209;p45"/>
-          <p:cNvSpPr txBox="1">
-            <a:spLocks noGrp="1"/>
-          </p:cNvSpPr>
-          <p:nvPr>
-            <p:ph type="title"/>
-          </p:nvPr>
-        </p:nvSpPr>
-        <p:spPr>
-          <a:xfrm>
-            <a:off x="801687" y="671512"/>
-            <a:ext cx="9085200" cy="1260600"/>
-          </a:xfrm>
-          <a:prstGeom prst="rect">
-            <a:avLst/>
-          </a:prstGeom>
-        </p:spPr>
-        <p:txBody>
-          <a:bodyPr spcFirstLastPara="1" wrap="square" lIns="52125" tIns="52125" rIns="52125" bIns="52125" anchor="ctr" anchorCtr="0">
-            <a:noAutofit/>
-          </a:bodyPr>
-          <a:lstStyle/>
-          <a:p>
-            <a:pPr marL="0" lvl="0" indent="0" algn="ctr" rtl="0">
-              <a:spcBef>
-                <a:spcPts val="0"/>
-              </a:spcBef>
-              <a:spcAft>
-                <a:spcPts val="0"/>
-              </a:spcAft>
-              <a:buNone/>
-            </a:pPr>
-            <a:r>
-              <a:rPr lang="en-GB" noProof="0" dirty="0"/>
-              <a:t>Announcements</a:t>
-            </a:r>
-            <a:br>
-              <a:rPr lang="en-GB" noProof="0" dirty="0"/>
-            </a:br>
-            <a:r>
-              <a:rPr lang="en-GB" noProof="0" dirty="0"/>
-              <a:t>and Consultations Rules</a:t>
-            </a:r>
-          </a:p>
-        </p:txBody>
-      </p:sp>
-      <p:sp>
-        <p:nvSpPr>
-          <p:cNvPr id="210" name="Google Shape;210;p45"/>
-          <p:cNvSpPr txBox="1">
-            <a:spLocks noGrp="1"/>
-          </p:cNvSpPr>
-          <p:nvPr>
-            <p:ph type="body" idx="1"/>
-          </p:nvPr>
-        </p:nvSpPr>
-        <p:spPr>
-          <a:xfrm>
-            <a:off x="801687" y="2184400"/>
-            <a:ext cx="9085200" cy="4538700"/>
-          </a:xfrm>
-          <a:prstGeom prst="rect">
-            <a:avLst/>
-          </a:prstGeom>
-        </p:spPr>
-        <p:txBody>
-          <a:bodyPr spcFirstLastPara="1" wrap="square" lIns="52125" tIns="52125" rIns="52125" bIns="52125" anchor="t" anchorCtr="0">
-            <a:noAutofit/>
-          </a:bodyPr>
-          <a:lstStyle/>
-          <a:p>
-            <a:pPr lvl="0">
-              <a:spcBef>
-                <a:spcPts val="0"/>
-              </a:spcBef>
-              <a:buClr>
-                <a:schemeClr val="dk1"/>
-              </a:buClr>
-            </a:pPr>
-            <a:r>
-              <a:rPr lang="en-GB" sz="3200" noProof="0" dirty="0">
-                <a:solidFill>
-                  <a:schemeClr val="dk1"/>
-                </a:solidFill>
-              </a:rPr>
-              <a:t>Microsoft Teams (use the code: </a:t>
-            </a:r>
-            <a:r>
-              <a:rPr lang="en-GB" sz="3200" b="1" noProof="0" dirty="0" err="1">
-                <a:solidFill>
-                  <a:schemeClr val="dk1"/>
-                </a:solidFill>
-              </a:rPr>
-              <a:t>txyjeye</a:t>
-            </a:r>
-            <a:r>
-              <a:rPr lang="en-GB" sz="3200" noProof="0" dirty="0">
-                <a:solidFill>
-                  <a:schemeClr val="dk1"/>
-                </a:solidFill>
-              </a:rPr>
-              <a:t>)</a:t>
-            </a:r>
-          </a:p>
-          <a:p>
-            <a:pPr marL="457200" lvl="0" indent="-457200" algn="l" rtl="0">
-              <a:spcBef>
-                <a:spcPts val="0"/>
-              </a:spcBef>
-              <a:spcAft>
-                <a:spcPts val="0"/>
-              </a:spcAft>
-              <a:buSzPts val="3600"/>
-              <a:buChar char="»"/>
-            </a:pPr>
-            <a:r>
-              <a:rPr lang="en-GB" sz="3200" noProof="0" dirty="0"/>
-              <a:t>Using channels:</a:t>
-            </a:r>
-          </a:p>
-          <a:p>
-            <a:pPr marL="914400" lvl="1" indent="-457200" algn="l" rtl="0">
-              <a:spcBef>
-                <a:spcPts val="0"/>
-              </a:spcBef>
-              <a:spcAft>
-                <a:spcPts val="0"/>
-              </a:spcAft>
-              <a:buSzPts val="3600"/>
-              <a:buChar char="–"/>
-            </a:pPr>
-            <a:r>
-              <a:rPr lang="en-GB" sz="3200" noProof="0" dirty="0"/>
-              <a:t>General - general topics</a:t>
-            </a:r>
-          </a:p>
-          <a:p>
-            <a:pPr marL="914400" lvl="1" indent="-457200" algn="l" rtl="0">
-              <a:spcBef>
-                <a:spcPts val="0"/>
-              </a:spcBef>
-              <a:spcAft>
-                <a:spcPts val="0"/>
-              </a:spcAft>
-              <a:buSzPts val="3600"/>
-              <a:buChar char="–"/>
-            </a:pPr>
-            <a:r>
-              <a:rPr lang="en-GB" sz="3200" noProof="0" dirty="0"/>
-              <a:t>Random - chit-chats, jokes, etc.</a:t>
-            </a:r>
-          </a:p>
-          <a:p>
-            <a:pPr marL="914400" lvl="1" indent="-457200" algn="l" rtl="0">
-              <a:spcBef>
-                <a:spcPts val="0"/>
-              </a:spcBef>
-              <a:spcAft>
-                <a:spcPts val="0"/>
-              </a:spcAft>
-              <a:buSzPts val="3600"/>
-              <a:buChar char="–"/>
-            </a:pPr>
-            <a:r>
-              <a:rPr lang="en-GB" sz="3200" noProof="0" dirty="0"/>
-              <a:t>Course-year (e.g., </a:t>
-            </a:r>
-            <a:r>
-              <a:rPr lang="en-GB" sz="3200" i="1" noProof="0" dirty="0"/>
-              <a:t>MIPaC-2021</a:t>
-            </a:r>
-            <a:r>
-              <a:rPr lang="en-GB" sz="3200" noProof="0" dirty="0"/>
-              <a:t>) – course related matters</a:t>
-            </a:r>
-          </a:p>
-          <a:p>
-            <a:pPr marL="457200" lvl="0" indent="-457200" algn="l" rtl="0">
-              <a:spcBef>
-                <a:spcPts val="0"/>
-              </a:spcBef>
-              <a:spcAft>
-                <a:spcPts val="0"/>
-              </a:spcAft>
-              <a:buSzPts val="3600"/>
-              <a:buChar char="»"/>
-            </a:pPr>
-            <a:r>
-              <a:rPr lang="en-GB" sz="3200" noProof="0" dirty="0"/>
-              <a:t>Avoid direct messages in problem-solving - share the knowledge</a:t>
-            </a:r>
-          </a:p>
-          <a:p>
-            <a:pPr marL="457200" lvl="0" indent="-457200" algn="l" rtl="0">
-              <a:spcBef>
-                <a:spcPts val="0"/>
-              </a:spcBef>
-              <a:spcAft>
-                <a:spcPts val="0"/>
-              </a:spcAft>
-              <a:buSzPts val="3600"/>
-              <a:buChar char="»"/>
-            </a:pPr>
-            <a:r>
-              <a:rPr lang="en-GB" sz="3200" noProof="0" dirty="0"/>
-              <a:t>Use [Issue Titles] and threads</a:t>
-            </a:r>
-          </a:p>
-        </p:txBody>
-      </p:sp>
-    </p:spTree>
-  </p:cSld>
-  <p:clrMapOvr>
-    <a:masterClrMapping/>
-  </p:clrMapOvr>
-</p:sld>
-</file>
-
 <file path=ppt/slides/slide3.xml><?xml version="1.0" encoding="utf-8"?>
 <p:sld xmlns:a="http://schemas.openxmlformats.org/drawingml/2006/main" xmlns:r="http://schemas.openxmlformats.org/officeDocument/2006/relationships" xmlns:p="http://schemas.openxmlformats.org/presentationml/2006/main">
   <p:cSld>
@@ -37133,7 +36783,7 @@
                   <a:schemeClr val="dk1"/>
                 </a:solidFill>
               </a:rPr>
-              <a:t>2⋅9×⇒18×</a:t>
+              <a:t>2⋅10×⇒20×</a:t>
             </a:r>
             <a:endParaRPr lang="en-GB" sz="3000" noProof="0" dirty="0"/>
           </a:p>
@@ -37514,7 +37164,29 @@
               </a:rPr>
               <a:t> (midterm, final)</a:t>
             </a:r>
-            <a:endParaRPr lang="en-GB" sz="3000" noProof="0" dirty="0"/>
+          </a:p>
+          <a:p>
+            <a:pPr indent="-419100">
+              <a:spcBef>
+                <a:spcPts val="0"/>
+              </a:spcBef>
+              <a:buClr>
+                <a:schemeClr val="dk1"/>
+              </a:buClr>
+              <a:buSzPts val="3000"/>
+            </a:pPr>
+            <a:r>
+              <a:rPr lang="en-GB" sz="3000" noProof="0" dirty="0"/>
+              <a:t>For all </a:t>
+            </a:r>
+            <a:r>
+              <a:rPr lang="en-GB" sz="3000" dirty="0"/>
+              <a:t>assignments </a:t>
+            </a:r>
+            <a:r>
+              <a:rPr lang="en-GB" sz="3000" noProof="0" dirty="0"/>
+              <a:t>declare if you use AI</a:t>
+            </a:r>
           </a:p>
         </p:txBody>
       </p:sp>

</xml_diff>

<commit_message>
Revert "Refactor and update video compression resources"
This reverts commit b45c851795accb0685b80824b5f6cfa7c7290490.
</commit_message>
<xml_diff>
--- a/(A)MIPaC Introduction.pptx
+++ b/(A)MIPaC Introduction.pptx
@@ -7,7 +7,7 @@
     <p:sldMasterId id="2147483683" r:id="rId3"/>
   </p:sldMasterIdLst>
   <p:notesMasterIdLst>
-    <p:notesMasterId r:id="rId23"/>
+    <p:notesMasterId r:id="rId24"/>
   </p:notesMasterIdLst>
   <p:sldIdLst>
     <p:sldId id="256" r:id="rId4"/>
@@ -29,6 +29,7 @@
     <p:sldId id="275" r:id="rId20"/>
     <p:sldId id="271" r:id="rId21"/>
     <p:sldId id="272" r:id="rId22"/>
+    <p:sldId id="264" r:id="rId23"/>
   </p:sldIdLst>
   <p:sldSz cx="10680700" cy="7556500"/>
   <p:notesSz cx="6858000" cy="9144000"/>
@@ -2301,6 +2302,118 @@
               <a:buNone/>
             </a:pPr>
             <a:endParaRPr/>
+          </a:p>
+        </p:txBody>
+      </p:sp>
+    </p:spTree>
+  </p:cSld>
+  <p:clrMapOvr>
+    <a:masterClrMapping/>
+  </p:clrMapOvr>
+</p:notes>
+</file>
+
+<file path=ppt/notesSlides/notesSlide20.xml><?xml version="1.0" encoding="utf-8"?>
+<p:notes xmlns:a="http://schemas.openxmlformats.org/drawingml/2006/main" xmlns:r="http://schemas.openxmlformats.org/officeDocument/2006/relationships" xmlns:p="http://schemas.openxmlformats.org/presentationml/2006/main" showMasterSp="0" showMasterPhAnim="0">
+  <p:cSld>
+    <p:spTree>
+      <p:nvGrpSpPr>
+        <p:cNvPr id="1" name="Shape 205"/>
+        <p:cNvGrpSpPr/>
+        <p:nvPr/>
+      </p:nvGrpSpPr>
+      <p:grpSpPr>
+        <a:xfrm>
+          <a:off x="0" y="0"/>
+          <a:ext cx="0" cy="0"/>
+          <a:chOff x="0" y="0"/>
+          <a:chExt cx="0" cy="0"/>
+        </a:xfrm>
+      </p:grpSpPr>
+      <p:sp>
+        <p:nvSpPr>
+          <p:cNvPr id="206" name="Google Shape;206;g9d962b619b_0_27:notes"/>
+          <p:cNvSpPr>
+            <a:spLocks noGrp="1" noRot="1" noChangeAspect="1"/>
+          </p:cNvSpPr>
+          <p:nvPr>
+            <p:ph type="sldImg" idx="2"/>
+          </p:nvPr>
+        </p:nvSpPr>
+        <p:spPr>
+          <a:xfrm>
+            <a:off x="1006475" y="685800"/>
+            <a:ext cx="4845050" cy="3429000"/>
+          </a:xfrm>
+          <a:custGeom>
+            <a:avLst/>
+            <a:gdLst/>
+            <a:ahLst/>
+            <a:cxnLst/>
+            <a:rect l="l" t="t" r="r" b="b"/>
+            <a:pathLst>
+              <a:path w="120000" h="120000" extrusionOk="0">
+                <a:moveTo>
+                  <a:pt x="0" y="0"/>
+                </a:moveTo>
+                <a:lnTo>
+                  <a:pt x="120000" y="0"/>
+                </a:lnTo>
+                <a:lnTo>
+                  <a:pt x="120000" y="120000"/>
+                </a:lnTo>
+                <a:lnTo>
+                  <a:pt x="0" y="120000"/>
+                </a:lnTo>
+                <a:close/>
+              </a:path>
+            </a:pathLst>
+          </a:custGeom>
+        </p:spPr>
+      </p:sp>
+      <p:sp>
+        <p:nvSpPr>
+          <p:cNvPr id="207" name="Google Shape;207;g9d962b619b_0_27:notes"/>
+          <p:cNvSpPr txBox="1">
+            <a:spLocks noGrp="1"/>
+          </p:cNvSpPr>
+          <p:nvPr>
+            <p:ph type="body" idx="1"/>
+          </p:nvPr>
+        </p:nvSpPr>
+        <p:spPr>
+          <a:xfrm>
+            <a:off x="914400" y="4343400"/>
+            <a:ext cx="5029200" cy="4114800"/>
+          </a:xfrm>
+          <a:prstGeom prst="rect">
+            <a:avLst/>
+          </a:prstGeom>
+        </p:spPr>
+        <p:txBody>
+          <a:bodyPr spcFirstLastPara="1" wrap="square" lIns="91425" tIns="45700" rIns="91425" bIns="45700" anchor="t" anchorCtr="0">
+            <a:noAutofit/>
+          </a:bodyPr>
+          <a:lstStyle/>
+          <a:p>
+            <a:pPr marL="0" lvl="0" indent="0" algn="l" rtl="0">
+              <a:spcBef>
+                <a:spcPts val="0"/>
+              </a:spcBef>
+              <a:spcAft>
+                <a:spcPts val="0"/>
+              </a:spcAft>
+              <a:buNone/>
+            </a:pPr>
+            <a:r>
+              <a:rPr lang="pl-PL" dirty="0"/>
+              <a:t>Show</a:t>
+            </a:r>
+            <a:r>
+              <a:rPr lang="en-GB" dirty="0"/>
+              <a:t> how to properly start conversations in MS Teams.</a:t>
+            </a:r>
+            <a:endParaRPr dirty="0"/>
           </a:p>
         </p:txBody>
       </p:sp>
@@ -36003,6 +36116,243 @@
 </p:sld>
 </file>
 
+<file path=ppt/slides/slide20.xml><?xml version="1.0" encoding="utf-8"?>
+<p:sld xmlns:a="http://schemas.openxmlformats.org/drawingml/2006/main" xmlns:r="http://schemas.openxmlformats.org/officeDocument/2006/relationships" xmlns:p="http://schemas.openxmlformats.org/presentationml/2006/main" show="0">
+  <p:cSld>
+    <p:spTree>
+      <p:nvGrpSpPr>
+        <p:cNvPr id="1" name="Shape 208"/>
+        <p:cNvGrpSpPr/>
+        <p:nvPr/>
+      </p:nvGrpSpPr>
+      <p:grpSpPr>
+        <a:xfrm>
+          <a:off x="0" y="0"/>
+          <a:ext cx="0" cy="0"/>
+          <a:chOff x="0" y="0"/>
+          <a:chExt cx="0" cy="0"/>
+        </a:xfrm>
+      </p:grpSpPr>
+      <p:sp>
+        <p:nvSpPr>
+          <p:cNvPr id="209" name="Google Shape;209;p45"/>
+          <p:cNvSpPr txBox="1">
+            <a:spLocks noGrp="1"/>
+          </p:cNvSpPr>
+          <p:nvPr>
+            <p:ph type="title"/>
+          </p:nvPr>
+        </p:nvSpPr>
+        <p:spPr>
+          <a:xfrm>
+            <a:off x="801687" y="671512"/>
+            <a:ext cx="9085200" cy="1260600"/>
+          </a:xfrm>
+          <a:prstGeom prst="rect">
+            <a:avLst/>
+          </a:prstGeom>
+        </p:spPr>
+        <p:txBody>
+          <a:bodyPr spcFirstLastPara="1" wrap="square" lIns="52125" tIns="52125" rIns="52125" bIns="52125" anchor="ctr" anchorCtr="0">
+            <a:noAutofit/>
+          </a:bodyPr>
+          <a:lstStyle/>
+          <a:p>
+            <a:pPr marL="0" lvl="0" indent="0" algn="ctr" rtl="0">
+              <a:spcBef>
+                <a:spcPts val="0"/>
+              </a:spcBef>
+              <a:spcAft>
+                <a:spcPts val="0"/>
+              </a:spcAft>
+              <a:buNone/>
+            </a:pPr>
+            <a:r>
+              <a:rPr lang="en-GB" noProof="0" dirty="0"/>
+              <a:t>Announcements</a:t>
+            </a:r>
+            <a:br>
+              <a:rPr lang="en-GB" noProof="0" dirty="0"/>
+            </a:br>
+            <a:r>
+              <a:rPr lang="en-GB" noProof="0" dirty="0"/>
+              <a:t>and Consultations Rules</a:t>
+            </a:r>
+          </a:p>
+        </p:txBody>
+      </p:sp>
+      <p:sp>
+        <p:nvSpPr>
+          <p:cNvPr id="210" name="Google Shape;210;p45"/>
+          <p:cNvSpPr txBox="1">
+            <a:spLocks noGrp="1"/>
+          </p:cNvSpPr>
+          <p:nvPr>
+            <p:ph type="body" idx="1"/>
+          </p:nvPr>
+        </p:nvSpPr>
+        <p:spPr>
+          <a:xfrm>
+            <a:off x="801687" y="2184400"/>
+            <a:ext cx="9085200" cy="4538700"/>
+          </a:xfrm>
+          <a:prstGeom prst="rect">
+            <a:avLst/>
+          </a:prstGeom>
+        </p:spPr>
+        <p:txBody>
+          <a:bodyPr spcFirstLastPara="1" wrap="square" lIns="52125" tIns="52125" rIns="52125" bIns="52125" anchor="t" anchorCtr="0">
+            <a:noAutofit/>
+          </a:bodyPr>
+          <a:lstStyle/>
+          <a:p>
+            <a:pPr lvl="0">
+              <a:spcBef>
+                <a:spcPts val="0"/>
+              </a:spcBef>
+              <a:buClr>
+                <a:schemeClr val="dk1"/>
+              </a:buClr>
+            </a:pPr>
+            <a:r>
+              <a:rPr lang="en-GB" sz="3200" noProof="0" dirty="0">
+                <a:solidFill>
+                  <a:schemeClr val="dk1"/>
+                </a:solidFill>
+              </a:rPr>
+              <a:t>Microsoft Teams (use the code: </a:t>
+            </a:r>
+            <a:r>
+              <a:rPr lang="en-GB" sz="3200" b="1" noProof="0" dirty="0" err="1">
+                <a:solidFill>
+                  <a:schemeClr val="dk1"/>
+                </a:solidFill>
+              </a:rPr>
+              <a:t>txyjeye</a:t>
+            </a:r>
+            <a:r>
+              <a:rPr lang="en-GB" sz="3200" noProof="0" dirty="0">
+                <a:solidFill>
+                  <a:schemeClr val="dk1"/>
+                </a:solidFill>
+              </a:rPr>
+              <a:t>)</a:t>
+            </a:r>
+          </a:p>
+          <a:p>
+            <a:pPr marL="457200" lvl="0" indent="-457200" algn="l" rtl="0">
+              <a:spcBef>
+                <a:spcPts val="0"/>
+              </a:spcBef>
+              <a:spcAft>
+                <a:spcPts val="0"/>
+              </a:spcAft>
+              <a:buSzPts val="3600"/>
+              <a:buChar char="»"/>
+            </a:pPr>
+            <a:r>
+              <a:rPr lang="en-GB" sz="3200" noProof="0" dirty="0"/>
+              <a:t>Using channels:</a:t>
+            </a:r>
+          </a:p>
+          <a:p>
+            <a:pPr marL="914400" lvl="1" indent="-457200" algn="l" rtl="0">
+              <a:spcBef>
+                <a:spcPts val="0"/>
+              </a:spcBef>
+              <a:spcAft>
+                <a:spcPts val="0"/>
+              </a:spcAft>
+              <a:buSzPts val="3600"/>
+              <a:buChar char="–"/>
+            </a:pPr>
+            <a:r>
+              <a:rPr lang="en-GB" sz="3200" noProof="0" dirty="0"/>
+              <a:t>General - general topics</a:t>
+            </a:r>
+          </a:p>
+          <a:p>
+            <a:pPr marL="914400" lvl="1" indent="-457200" algn="l" rtl="0">
+              <a:spcBef>
+                <a:spcPts val="0"/>
+              </a:spcBef>
+              <a:spcAft>
+                <a:spcPts val="0"/>
+              </a:spcAft>
+              <a:buSzPts val="3600"/>
+              <a:buChar char="–"/>
+            </a:pPr>
+            <a:r>
+              <a:rPr lang="en-GB" sz="3200" noProof="0" dirty="0"/>
+              <a:t>Random - chit-chats, jokes, etc.</a:t>
+            </a:r>
+          </a:p>
+          <a:p>
+            <a:pPr marL="914400" lvl="1" indent="-457200" algn="l" rtl="0">
+              <a:spcBef>
+                <a:spcPts val="0"/>
+              </a:spcBef>
+              <a:spcAft>
+                <a:spcPts val="0"/>
+              </a:spcAft>
+              <a:buSzPts val="3600"/>
+              <a:buChar char="–"/>
+            </a:pPr>
+            <a:r>
+              <a:rPr lang="en-GB" sz="3200" noProof="0" dirty="0"/>
+              <a:t>Course-year (e.g., </a:t>
+            </a:r>
+            <a:r>
+              <a:rPr lang="en-GB" sz="3200" i="1" noProof="0" dirty="0"/>
+              <a:t>MIPaC-2021</a:t>
+            </a:r>
+            <a:r>
+              <a:rPr lang="en-GB" sz="3200" noProof="0" dirty="0"/>
+              <a:t>) – course related matters</a:t>
+            </a:r>
+          </a:p>
+          <a:p>
+            <a:pPr marL="457200" lvl="0" indent="-457200" algn="l" rtl="0">
+              <a:spcBef>
+                <a:spcPts val="0"/>
+              </a:spcBef>
+              <a:spcAft>
+                <a:spcPts val="0"/>
+              </a:spcAft>
+              <a:buSzPts val="3600"/>
+              <a:buChar char="»"/>
+            </a:pPr>
+            <a:r>
+              <a:rPr lang="en-GB" sz="3200" noProof="0" dirty="0"/>
+              <a:t>Avoid direct messages in problem-solving - share the knowledge</a:t>
+            </a:r>
+          </a:p>
+          <a:p>
+            <a:pPr marL="457200" lvl="0" indent="-457200" algn="l" rtl="0">
+              <a:spcBef>
+                <a:spcPts val="0"/>
+              </a:spcBef>
+              <a:spcAft>
+                <a:spcPts val="0"/>
+              </a:spcAft>
+              <a:buSzPts val="3600"/>
+              <a:buChar char="»"/>
+            </a:pPr>
+            <a:r>
+              <a:rPr lang="en-GB" sz="3200" noProof="0" dirty="0"/>
+              <a:t>Use [Issue Titles] and threads</a:t>
+            </a:r>
+          </a:p>
+        </p:txBody>
+      </p:sp>
+    </p:spTree>
+  </p:cSld>
+  <p:clrMapOvr>
+    <a:masterClrMapping/>
+  </p:clrMapOvr>
+</p:sld>
+</file>
+
 <file path=ppt/slides/slide3.xml><?xml version="1.0" encoding="utf-8"?>
 <p:sld xmlns:a="http://schemas.openxmlformats.org/drawingml/2006/main" xmlns:r="http://schemas.openxmlformats.org/officeDocument/2006/relationships" xmlns:p="http://schemas.openxmlformats.org/presentationml/2006/main">
   <p:cSld>
@@ -36783,7 +37133,7 @@
                   <a:schemeClr val="dk1"/>
                 </a:solidFill>
               </a:rPr>
-              <a:t>2⋅10×⇒20×</a:t>
+              <a:t>2⋅9×⇒18×</a:t>
             </a:r>
             <a:endParaRPr lang="en-GB" sz="3000" noProof="0" dirty="0"/>
           </a:p>
@@ -37164,29 +37514,7 @@
               </a:rPr>
               <a:t> (midterm, final)</a:t>
             </a:r>
-          </a:p>
-          <a:p>
-            <a:pPr indent="-419100">
-              <a:spcBef>
-                <a:spcPts val="0"/>
-              </a:spcBef>
-              <a:buClr>
-                <a:schemeClr val="dk1"/>
-              </a:buClr>
-              <a:buSzPts val="3000"/>
-            </a:pPr>
-            <a:r>
-              <a:rPr lang="en-GB" sz="3000" noProof="0" dirty="0"/>
-              <a:t>For all </a:t>
-            </a:r>
-            <a:r>
-              <a:rPr lang="en-GB" sz="3000" dirty="0"/>
-              <a:t>assignments </a:t>
-            </a:r>
-            <a:r>
-              <a:rPr lang="en-GB" sz="3000" noProof="0" dirty="0"/>
-              <a:t>declare if you use AI</a:t>
-            </a:r>
+            <a:endParaRPr lang="en-GB" sz="3000" noProof="0" dirty="0"/>
           </a:p>
         </p:txBody>
       </p:sp>

</xml_diff>

<commit_message>
Add initial MATLAB model for video signal compression analysis
Introduced the MATLAB Simulink model `Video.mdl.r2007b` to the repository under the `03 Video Signal Compression/old` directory. This model provides the foundation for analyzing video compression methods with defined configurations and parameters.
</commit_message>
<xml_diff>
--- a/(A)MIPaC Introduction.pptx
+++ b/(A)MIPaC Introduction.pptx
@@ -7,7 +7,7 @@
     <p:sldMasterId id="2147483683" r:id="rId3"/>
   </p:sldMasterIdLst>
   <p:notesMasterIdLst>
-    <p:notesMasterId r:id="rId24"/>
+    <p:notesMasterId r:id="rId21"/>
   </p:notesMasterIdLst>
   <p:sldIdLst>
     <p:sldId id="256" r:id="rId4"/>
@@ -20,16 +20,13 @@
     <p:sldId id="263" r:id="rId11"/>
     <p:sldId id="265" r:id="rId12"/>
     <p:sldId id="266" r:id="rId13"/>
-    <p:sldId id="267" r:id="rId14"/>
-    <p:sldId id="268" r:id="rId15"/>
-    <p:sldId id="269" r:id="rId16"/>
-    <p:sldId id="270" r:id="rId17"/>
-    <p:sldId id="276" r:id="rId18"/>
-    <p:sldId id="274" r:id="rId19"/>
-    <p:sldId id="275" r:id="rId20"/>
-    <p:sldId id="271" r:id="rId21"/>
-    <p:sldId id="272" r:id="rId22"/>
-    <p:sldId id="264" r:id="rId23"/>
+    <p:sldId id="269" r:id="rId14"/>
+    <p:sldId id="270" r:id="rId15"/>
+    <p:sldId id="276" r:id="rId16"/>
+    <p:sldId id="274" r:id="rId17"/>
+    <p:sldId id="275" r:id="rId18"/>
+    <p:sldId id="271" r:id="rId19"/>
+    <p:sldId id="272" r:id="rId20"/>
   </p:sldIdLst>
   <p:sldSz cx="10680700" cy="7556500"/>
   <p:notesSz cx="6858000" cy="9144000"/>
@@ -1159,7 +1156,7 @@
   <p:cSld>
     <p:spTree>
       <p:nvGrpSpPr>
-        <p:cNvPr id="1" name="Shape 222"/>
+        <p:cNvPr id="1" name="Shape 234"/>
         <p:cNvGrpSpPr/>
         <p:nvPr/>
       </p:nvGrpSpPr>
@@ -1173,7 +1170,7 @@
       </p:grpSpPr>
       <p:sp>
         <p:nvSpPr>
-          <p:cNvPr id="223" name="Google Shape;223;g43a0576814_1_60:notes"/>
+          <p:cNvPr id="235" name="Google Shape;235;g43a0576814_1_78:notes"/>
           <p:cNvSpPr>
             <a:spLocks noGrp="1" noRot="1" noChangeAspect="1"/>
           </p:cNvSpPr>
@@ -1214,7 +1211,7 @@
       </p:sp>
       <p:sp>
         <p:nvSpPr>
-          <p:cNvPr id="224" name="Google Shape;224;g43a0576814_1_60:notes"/>
+          <p:cNvPr id="236" name="Google Shape;236;g43a0576814_1_78:notes"/>
           <p:cNvSpPr txBox="1">
             <a:spLocks noGrp="1"/>
           </p:cNvSpPr>
@@ -1246,7 +1243,47 @@
               </a:spcAft>
               <a:buNone/>
             </a:pPr>
-            <a:endParaRPr/>
+            <a:r>
+              <a:rPr lang="en-US" dirty="0"/>
+              <a:t>40/80 -&gt; MIPaC/</a:t>
+            </a:r>
+            <a:r>
+              <a:rPr lang="en-US" dirty="0" err="1"/>
+              <a:t>AMIPaC</a:t>
+            </a:r>
+            <a:r>
+              <a:rPr lang="en-US" dirty="0"/>
+              <a:t> points</a:t>
+            </a:r>
+            <a:endParaRPr dirty="0"/>
+          </a:p>
+          <a:p>
+            <a:pPr marL="0" lvl="0" indent="0" algn="l" rtl="0">
+              <a:spcBef>
+                <a:spcPts val="0"/>
+              </a:spcBef>
+              <a:spcAft>
+                <a:spcPts val="0"/>
+              </a:spcAft>
+              <a:buNone/>
+            </a:pPr>
+            <a:endParaRPr dirty="0"/>
+          </a:p>
+          <a:p>
+            <a:pPr marL="0" lvl="0" indent="0" algn="l" rtl="0">
+              <a:spcBef>
+                <a:spcPts val="0"/>
+              </a:spcBef>
+              <a:spcAft>
+                <a:spcPts val="0"/>
+              </a:spcAft>
+              <a:buNone/>
+            </a:pPr>
+            <a:r>
+              <a:rPr lang="en-US" dirty="0"/>
+              <a:t>Notice the total number of points exceed the amount required to have 5.0.</a:t>
+            </a:r>
+            <a:endParaRPr dirty="0"/>
           </a:p>
         </p:txBody>
       </p:sp>
@@ -1259,6 +1296,170 @@
 </file>
 
 <file path=ppt/notesSlides/notesSlide12.xml><?xml version="1.0" encoding="utf-8"?>
+<p:notes xmlns:a="http://schemas.openxmlformats.org/drawingml/2006/main" xmlns:r="http://schemas.openxmlformats.org/officeDocument/2006/relationships" xmlns:p="http://schemas.openxmlformats.org/presentationml/2006/main" showMasterSp="0" showMasterPhAnim="0">
+  <p:cSld>
+    <p:spTree>
+      <p:nvGrpSpPr>
+        <p:cNvPr id="1" name="Shape 240"/>
+        <p:cNvGrpSpPr/>
+        <p:nvPr/>
+      </p:nvGrpSpPr>
+      <p:grpSpPr>
+        <a:xfrm>
+          <a:off x="0" y="0"/>
+          <a:ext cx="0" cy="0"/>
+          <a:chOff x="0" y="0"/>
+          <a:chExt cx="0" cy="0"/>
+        </a:xfrm>
+      </p:grpSpPr>
+      <p:sp>
+        <p:nvSpPr>
+          <p:cNvPr id="241" name="Google Shape;241;g9d962b619b_0_17:notes"/>
+          <p:cNvSpPr>
+            <a:spLocks noGrp="1" noRot="1" noChangeAspect="1"/>
+          </p:cNvSpPr>
+          <p:nvPr>
+            <p:ph type="sldImg" idx="2"/>
+          </p:nvPr>
+        </p:nvSpPr>
+        <p:spPr>
+          <a:xfrm>
+            <a:off x="1006475" y="685800"/>
+            <a:ext cx="4845050" cy="3429000"/>
+          </a:xfrm>
+          <a:custGeom>
+            <a:avLst/>
+            <a:gdLst/>
+            <a:ahLst/>
+            <a:cxnLst/>
+            <a:rect l="l" t="t" r="r" b="b"/>
+            <a:pathLst>
+              <a:path w="120000" h="120000" extrusionOk="0">
+                <a:moveTo>
+                  <a:pt x="0" y="0"/>
+                </a:moveTo>
+                <a:lnTo>
+                  <a:pt x="120000" y="0"/>
+                </a:lnTo>
+                <a:lnTo>
+                  <a:pt x="120000" y="120000"/>
+                </a:lnTo>
+                <a:lnTo>
+                  <a:pt x="0" y="120000"/>
+                </a:lnTo>
+                <a:close/>
+              </a:path>
+            </a:pathLst>
+          </a:custGeom>
+        </p:spPr>
+      </p:sp>
+      <p:sp>
+        <p:nvSpPr>
+          <p:cNvPr id="242" name="Google Shape;242;g9d962b619b_0_17:notes"/>
+          <p:cNvSpPr txBox="1">
+            <a:spLocks noGrp="1"/>
+          </p:cNvSpPr>
+          <p:nvPr>
+            <p:ph type="body" idx="1"/>
+          </p:nvPr>
+        </p:nvSpPr>
+        <p:spPr>
+          <a:xfrm>
+            <a:off x="914400" y="4343400"/>
+            <a:ext cx="5029200" cy="4114800"/>
+          </a:xfrm>
+          <a:prstGeom prst="rect">
+            <a:avLst/>
+          </a:prstGeom>
+        </p:spPr>
+        <p:txBody>
+          <a:bodyPr spcFirstLastPara="1" wrap="square" lIns="91425" tIns="45700" rIns="91425" bIns="45700" anchor="t" anchorCtr="0">
+            <a:noAutofit/>
+          </a:bodyPr>
+          <a:lstStyle/>
+          <a:p>
+            <a:pPr marL="0" lvl="0" indent="0" algn="l" rtl="0">
+              <a:spcBef>
+                <a:spcPts val="0"/>
+              </a:spcBef>
+              <a:spcAft>
+                <a:spcPts val="0"/>
+              </a:spcAft>
+              <a:buNone/>
+            </a:pPr>
+            <a:r>
+              <a:rPr lang="en-US" dirty="0"/>
+              <a:t>40/80 -&gt; MIPaC/</a:t>
+            </a:r>
+            <a:r>
+              <a:rPr lang="en-US" dirty="0" err="1"/>
+              <a:t>AMIPaC</a:t>
+            </a:r>
+            <a:r>
+              <a:rPr lang="en-US" dirty="0"/>
+              <a:t> points</a:t>
+            </a:r>
+            <a:endParaRPr dirty="0"/>
+          </a:p>
+          <a:p>
+            <a:pPr marL="0" lvl="0" indent="0" algn="l" rtl="0">
+              <a:spcBef>
+                <a:spcPts val="0"/>
+              </a:spcBef>
+              <a:spcAft>
+                <a:spcPts val="0"/>
+              </a:spcAft>
+              <a:buNone/>
+            </a:pPr>
+            <a:endParaRPr dirty="0"/>
+          </a:p>
+          <a:p>
+            <a:pPr marL="0" lvl="0" indent="0" algn="l" rtl="0">
+              <a:spcBef>
+                <a:spcPts val="0"/>
+              </a:spcBef>
+              <a:spcAft>
+                <a:spcPts val="0"/>
+              </a:spcAft>
+              <a:buNone/>
+            </a:pPr>
+            <a:r>
+              <a:rPr lang="en-US" dirty="0"/>
+              <a:t>Notice </a:t>
+            </a:r>
+            <a:r>
+              <a:rPr lang="pl-PL" dirty="0" err="1"/>
+              <a:t>that</a:t>
+            </a:r>
+            <a:r>
+              <a:rPr lang="pl-PL" dirty="0"/>
+              <a:t> </a:t>
+            </a:r>
+            <a:r>
+              <a:rPr lang="en-US" dirty="0"/>
+              <a:t>the total number of points exceed</a:t>
+            </a:r>
+            <a:r>
+              <a:rPr lang="pl-PL" dirty="0"/>
+              <a:t>s</a:t>
+            </a:r>
+            <a:r>
+              <a:rPr lang="en-US" dirty="0"/>
+              <a:t> the amount required to have 5.0.</a:t>
+            </a:r>
+            <a:endParaRPr dirty="0"/>
+          </a:p>
+        </p:txBody>
+      </p:sp>
+    </p:spTree>
+  </p:cSld>
+  <p:clrMapOvr>
+    <a:masterClrMapping/>
+  </p:clrMapOvr>
+</p:notes>
+</file>
+
+<file path=ppt/notesSlides/notesSlide13.xml><?xml version="1.0" encoding="utf-8"?>
 <p:notes xmlns:a="http://schemas.openxmlformats.org/drawingml/2006/main" xmlns:r="http://schemas.openxmlformats.org/officeDocument/2006/relationships" xmlns:p="http://schemas.openxmlformats.org/presentationml/2006/main" showMasterSp="0" showMasterPhAnim="0">
   <p:cSld>
     <p:spTree>
@@ -1355,418 +1556,6 @@
         </p:txBody>
       </p:sp>
     </p:spTree>
-  </p:cSld>
-  <p:clrMapOvr>
-    <a:masterClrMapping/>
-  </p:clrMapOvr>
-</p:notes>
-</file>
-
-<file path=ppt/notesSlides/notesSlide13.xml><?xml version="1.0" encoding="utf-8"?>
-<p:notes xmlns:a="http://schemas.openxmlformats.org/drawingml/2006/main" xmlns:r="http://schemas.openxmlformats.org/officeDocument/2006/relationships" xmlns:p="http://schemas.openxmlformats.org/presentationml/2006/main" showMasterSp="0" showMasterPhAnim="0">
-  <p:cSld>
-    <p:spTree>
-      <p:nvGrpSpPr>
-        <p:cNvPr id="1" name="Shape 234"/>
-        <p:cNvGrpSpPr/>
-        <p:nvPr/>
-      </p:nvGrpSpPr>
-      <p:grpSpPr>
-        <a:xfrm>
-          <a:off x="0" y="0"/>
-          <a:ext cx="0" cy="0"/>
-          <a:chOff x="0" y="0"/>
-          <a:chExt cx="0" cy="0"/>
-        </a:xfrm>
-      </p:grpSpPr>
-      <p:sp>
-        <p:nvSpPr>
-          <p:cNvPr id="235" name="Google Shape;235;g43a0576814_1_78:notes"/>
-          <p:cNvSpPr>
-            <a:spLocks noGrp="1" noRot="1" noChangeAspect="1"/>
-          </p:cNvSpPr>
-          <p:nvPr>
-            <p:ph type="sldImg" idx="2"/>
-          </p:nvPr>
-        </p:nvSpPr>
-        <p:spPr>
-          <a:xfrm>
-            <a:off x="1006475" y="685800"/>
-            <a:ext cx="4845050" cy="3429000"/>
-          </a:xfrm>
-          <a:custGeom>
-            <a:avLst/>
-            <a:gdLst/>
-            <a:ahLst/>
-            <a:cxnLst/>
-            <a:rect l="l" t="t" r="r" b="b"/>
-            <a:pathLst>
-              <a:path w="120000" h="120000" extrusionOk="0">
-                <a:moveTo>
-                  <a:pt x="0" y="0"/>
-                </a:moveTo>
-                <a:lnTo>
-                  <a:pt x="120000" y="0"/>
-                </a:lnTo>
-                <a:lnTo>
-                  <a:pt x="120000" y="120000"/>
-                </a:lnTo>
-                <a:lnTo>
-                  <a:pt x="0" y="120000"/>
-                </a:lnTo>
-                <a:close/>
-              </a:path>
-            </a:pathLst>
-          </a:custGeom>
-        </p:spPr>
-      </p:sp>
-      <p:sp>
-        <p:nvSpPr>
-          <p:cNvPr id="236" name="Google Shape;236;g43a0576814_1_78:notes"/>
-          <p:cNvSpPr txBox="1">
-            <a:spLocks noGrp="1"/>
-          </p:cNvSpPr>
-          <p:nvPr>
-            <p:ph type="body" idx="1"/>
-          </p:nvPr>
-        </p:nvSpPr>
-        <p:spPr>
-          <a:xfrm>
-            <a:off x="914400" y="4343400"/>
-            <a:ext cx="5029200" cy="4114800"/>
-          </a:xfrm>
-          <a:prstGeom prst="rect">
-            <a:avLst/>
-          </a:prstGeom>
-        </p:spPr>
-        <p:txBody>
-          <a:bodyPr spcFirstLastPara="1" wrap="square" lIns="91425" tIns="45700" rIns="91425" bIns="45700" anchor="t" anchorCtr="0">
-            <a:noAutofit/>
-          </a:bodyPr>
-          <a:lstStyle/>
-          <a:p>
-            <a:pPr marL="0" lvl="0" indent="0" algn="l" rtl="0">
-              <a:spcBef>
-                <a:spcPts val="0"/>
-              </a:spcBef>
-              <a:spcAft>
-                <a:spcPts val="0"/>
-              </a:spcAft>
-              <a:buNone/>
-            </a:pPr>
-            <a:r>
-              <a:rPr lang="en-US" dirty="0"/>
-              <a:t>40/80 -&gt; MIPaC/</a:t>
-            </a:r>
-            <a:r>
-              <a:rPr lang="en-US" dirty="0" err="1"/>
-              <a:t>AMIPaC</a:t>
-            </a:r>
-            <a:r>
-              <a:rPr lang="en-US" dirty="0"/>
-              <a:t> points</a:t>
-            </a:r>
-            <a:endParaRPr dirty="0"/>
-          </a:p>
-          <a:p>
-            <a:pPr marL="0" lvl="0" indent="0" algn="l" rtl="0">
-              <a:spcBef>
-                <a:spcPts val="0"/>
-              </a:spcBef>
-              <a:spcAft>
-                <a:spcPts val="0"/>
-              </a:spcAft>
-              <a:buNone/>
-            </a:pPr>
-            <a:endParaRPr dirty="0"/>
-          </a:p>
-          <a:p>
-            <a:pPr marL="0" lvl="0" indent="0" algn="l" rtl="0">
-              <a:spcBef>
-                <a:spcPts val="0"/>
-              </a:spcBef>
-              <a:spcAft>
-                <a:spcPts val="0"/>
-              </a:spcAft>
-              <a:buNone/>
-            </a:pPr>
-            <a:r>
-              <a:rPr lang="en-US" dirty="0"/>
-              <a:t>Notice the total number of points exceed the amount required to have 5.0.</a:t>
-            </a:r>
-            <a:endParaRPr dirty="0"/>
-          </a:p>
-        </p:txBody>
-      </p:sp>
-    </p:spTree>
-  </p:cSld>
-  <p:clrMapOvr>
-    <a:masterClrMapping/>
-  </p:clrMapOvr>
-</p:notes>
-</file>
-
-<file path=ppt/notesSlides/notesSlide14.xml><?xml version="1.0" encoding="utf-8"?>
-<p:notes xmlns:a="http://schemas.openxmlformats.org/drawingml/2006/main" xmlns:r="http://schemas.openxmlformats.org/officeDocument/2006/relationships" xmlns:p="http://schemas.openxmlformats.org/presentationml/2006/main" showMasterSp="0" showMasterPhAnim="0">
-  <p:cSld>
-    <p:spTree>
-      <p:nvGrpSpPr>
-        <p:cNvPr id="1" name="Shape 240"/>
-        <p:cNvGrpSpPr/>
-        <p:nvPr/>
-      </p:nvGrpSpPr>
-      <p:grpSpPr>
-        <a:xfrm>
-          <a:off x="0" y="0"/>
-          <a:ext cx="0" cy="0"/>
-          <a:chOff x="0" y="0"/>
-          <a:chExt cx="0" cy="0"/>
-        </a:xfrm>
-      </p:grpSpPr>
-      <p:sp>
-        <p:nvSpPr>
-          <p:cNvPr id="241" name="Google Shape;241;g9d962b619b_0_17:notes"/>
-          <p:cNvSpPr>
-            <a:spLocks noGrp="1" noRot="1" noChangeAspect="1"/>
-          </p:cNvSpPr>
-          <p:nvPr>
-            <p:ph type="sldImg" idx="2"/>
-          </p:nvPr>
-        </p:nvSpPr>
-        <p:spPr>
-          <a:xfrm>
-            <a:off x="1006475" y="685800"/>
-            <a:ext cx="4845050" cy="3429000"/>
-          </a:xfrm>
-          <a:custGeom>
-            <a:avLst/>
-            <a:gdLst/>
-            <a:ahLst/>
-            <a:cxnLst/>
-            <a:rect l="l" t="t" r="r" b="b"/>
-            <a:pathLst>
-              <a:path w="120000" h="120000" extrusionOk="0">
-                <a:moveTo>
-                  <a:pt x="0" y="0"/>
-                </a:moveTo>
-                <a:lnTo>
-                  <a:pt x="120000" y="0"/>
-                </a:lnTo>
-                <a:lnTo>
-                  <a:pt x="120000" y="120000"/>
-                </a:lnTo>
-                <a:lnTo>
-                  <a:pt x="0" y="120000"/>
-                </a:lnTo>
-                <a:close/>
-              </a:path>
-            </a:pathLst>
-          </a:custGeom>
-        </p:spPr>
-      </p:sp>
-      <p:sp>
-        <p:nvSpPr>
-          <p:cNvPr id="242" name="Google Shape;242;g9d962b619b_0_17:notes"/>
-          <p:cNvSpPr txBox="1">
-            <a:spLocks noGrp="1"/>
-          </p:cNvSpPr>
-          <p:nvPr>
-            <p:ph type="body" idx="1"/>
-          </p:nvPr>
-        </p:nvSpPr>
-        <p:spPr>
-          <a:xfrm>
-            <a:off x="914400" y="4343400"/>
-            <a:ext cx="5029200" cy="4114800"/>
-          </a:xfrm>
-          <a:prstGeom prst="rect">
-            <a:avLst/>
-          </a:prstGeom>
-        </p:spPr>
-        <p:txBody>
-          <a:bodyPr spcFirstLastPara="1" wrap="square" lIns="91425" tIns="45700" rIns="91425" bIns="45700" anchor="t" anchorCtr="0">
-            <a:noAutofit/>
-          </a:bodyPr>
-          <a:lstStyle/>
-          <a:p>
-            <a:pPr marL="0" lvl="0" indent="0" algn="l" rtl="0">
-              <a:spcBef>
-                <a:spcPts val="0"/>
-              </a:spcBef>
-              <a:spcAft>
-                <a:spcPts val="0"/>
-              </a:spcAft>
-              <a:buNone/>
-            </a:pPr>
-            <a:r>
-              <a:rPr lang="en-US" dirty="0"/>
-              <a:t>40/80 -&gt; MIPaC/</a:t>
-            </a:r>
-            <a:r>
-              <a:rPr lang="en-US" dirty="0" err="1"/>
-              <a:t>AMIPaC</a:t>
-            </a:r>
-            <a:r>
-              <a:rPr lang="en-US" dirty="0"/>
-              <a:t> points</a:t>
-            </a:r>
-            <a:endParaRPr dirty="0"/>
-          </a:p>
-          <a:p>
-            <a:pPr marL="0" lvl="0" indent="0" algn="l" rtl="0">
-              <a:spcBef>
-                <a:spcPts val="0"/>
-              </a:spcBef>
-              <a:spcAft>
-                <a:spcPts val="0"/>
-              </a:spcAft>
-              <a:buNone/>
-            </a:pPr>
-            <a:endParaRPr dirty="0"/>
-          </a:p>
-          <a:p>
-            <a:pPr marL="0" lvl="0" indent="0" algn="l" rtl="0">
-              <a:spcBef>
-                <a:spcPts val="0"/>
-              </a:spcBef>
-              <a:spcAft>
-                <a:spcPts val="0"/>
-              </a:spcAft>
-              <a:buNone/>
-            </a:pPr>
-            <a:r>
-              <a:rPr lang="en-US" dirty="0"/>
-              <a:t>Notice </a:t>
-            </a:r>
-            <a:r>
-              <a:rPr lang="pl-PL" dirty="0" err="1"/>
-              <a:t>that</a:t>
-            </a:r>
-            <a:r>
-              <a:rPr lang="pl-PL" dirty="0"/>
-              <a:t> </a:t>
-            </a:r>
-            <a:r>
-              <a:rPr lang="en-US" dirty="0"/>
-              <a:t>the total number of points exceed</a:t>
-            </a:r>
-            <a:r>
-              <a:rPr lang="pl-PL" dirty="0"/>
-              <a:t>s</a:t>
-            </a:r>
-            <a:r>
-              <a:rPr lang="en-US" dirty="0"/>
-              <a:t> the amount required to have 5.0.</a:t>
-            </a:r>
-            <a:endParaRPr dirty="0"/>
-          </a:p>
-        </p:txBody>
-      </p:sp>
-    </p:spTree>
-  </p:cSld>
-  <p:clrMapOvr>
-    <a:masterClrMapping/>
-  </p:clrMapOvr>
-</p:notes>
-</file>
-
-<file path=ppt/notesSlides/notesSlide15.xml><?xml version="1.0" encoding="utf-8"?>
-<p:notes xmlns:a="http://schemas.openxmlformats.org/drawingml/2006/main" xmlns:r="http://schemas.openxmlformats.org/officeDocument/2006/relationships" xmlns:p="http://schemas.openxmlformats.org/presentationml/2006/main" showMasterSp="0" showMasterPhAnim="0">
-  <p:cSld>
-    <p:spTree>
-      <p:nvGrpSpPr>
-        <p:cNvPr id="1" name="Shape 228"/>
-        <p:cNvGrpSpPr/>
-        <p:nvPr/>
-      </p:nvGrpSpPr>
-      <p:grpSpPr>
-        <a:xfrm>
-          <a:off x="0" y="0"/>
-          <a:ext cx="0" cy="0"/>
-          <a:chOff x="0" y="0"/>
-          <a:chExt cx="0" cy="0"/>
-        </a:xfrm>
-      </p:grpSpPr>
-      <p:sp>
-        <p:nvSpPr>
-          <p:cNvPr id="229" name="Google Shape;229;g43a0576814_1_66:notes"/>
-          <p:cNvSpPr>
-            <a:spLocks noGrp="1" noRot="1" noChangeAspect="1"/>
-          </p:cNvSpPr>
-          <p:nvPr>
-            <p:ph type="sldImg" idx="2"/>
-          </p:nvPr>
-        </p:nvSpPr>
-        <p:spPr>
-          <a:xfrm>
-            <a:off x="1006475" y="685800"/>
-            <a:ext cx="4845050" cy="3429000"/>
-          </a:xfrm>
-          <a:custGeom>
-            <a:avLst/>
-            <a:gdLst/>
-            <a:ahLst/>
-            <a:cxnLst/>
-            <a:rect l="l" t="t" r="r" b="b"/>
-            <a:pathLst>
-              <a:path w="120000" h="120000" extrusionOk="0">
-                <a:moveTo>
-                  <a:pt x="0" y="0"/>
-                </a:moveTo>
-                <a:lnTo>
-                  <a:pt x="120000" y="0"/>
-                </a:lnTo>
-                <a:lnTo>
-                  <a:pt x="120000" y="120000"/>
-                </a:lnTo>
-                <a:lnTo>
-                  <a:pt x="0" y="120000"/>
-                </a:lnTo>
-                <a:close/>
-              </a:path>
-            </a:pathLst>
-          </a:custGeom>
-        </p:spPr>
-      </p:sp>
-      <p:sp>
-        <p:nvSpPr>
-          <p:cNvPr id="230" name="Google Shape;230;g43a0576814_1_66:notes"/>
-          <p:cNvSpPr txBox="1">
-            <a:spLocks noGrp="1"/>
-          </p:cNvSpPr>
-          <p:nvPr>
-            <p:ph type="body" idx="1"/>
-          </p:nvPr>
-        </p:nvSpPr>
-        <p:spPr>
-          <a:xfrm>
-            <a:off x="914400" y="4343400"/>
-            <a:ext cx="5029200" cy="4114800"/>
-          </a:xfrm>
-          <a:prstGeom prst="rect">
-            <a:avLst/>
-          </a:prstGeom>
-        </p:spPr>
-        <p:txBody>
-          <a:bodyPr spcFirstLastPara="1" wrap="square" lIns="91425" tIns="45700" rIns="91425" bIns="45700" anchor="t" anchorCtr="0">
-            <a:noAutofit/>
-          </a:bodyPr>
-          <a:lstStyle/>
-          <a:p>
-            <a:pPr marL="0" lvl="0" indent="0" algn="l" rtl="0">
-              <a:spcBef>
-                <a:spcPts val="0"/>
-              </a:spcBef>
-              <a:spcAft>
-                <a:spcPts val="0"/>
-              </a:spcAft>
-              <a:buNone/>
-            </a:pPr>
-            <a:endParaRPr/>
-          </a:p>
-        </p:txBody>
-      </p:sp>
-    </p:spTree>
     <p:extLst>
       <p:ext uri="{BB962C8B-B14F-4D97-AF65-F5344CB8AC3E}">
         <p14:creationId xmlns:p14="http://schemas.microsoft.com/office/powerpoint/2010/main" val="971156018"/>
@@ -1779,7 +1568,7 @@
 </p:notes>
 </file>
 
-<file path=ppt/notesSlides/notesSlide16.xml><?xml version="1.0" encoding="utf-8"?>
+<file path=ppt/notesSlides/notesSlide14.xml><?xml version="1.0" encoding="utf-8"?>
 <p:notes xmlns:a="http://schemas.openxmlformats.org/drawingml/2006/main" xmlns:r="http://schemas.openxmlformats.org/officeDocument/2006/relationships" xmlns:p="http://schemas.openxmlformats.org/presentationml/2006/main" showMasterSp="0" showMasterPhAnim="0">
   <p:cSld>
     <p:spTree>
@@ -1888,7 +1677,7 @@
 </p:notes>
 </file>
 
-<file path=ppt/notesSlides/notesSlide17.xml><?xml version="1.0" encoding="utf-8"?>
+<file path=ppt/notesSlides/notesSlide15.xml><?xml version="1.0" encoding="utf-8"?>
 <p:notes xmlns:a="http://schemas.openxmlformats.org/drawingml/2006/main" xmlns:r="http://schemas.openxmlformats.org/officeDocument/2006/relationships" xmlns:p="http://schemas.openxmlformats.org/presentationml/2006/main" showMasterSp="0" showMasterPhAnim="0">
   <p:cSld>
     <p:spTree>
@@ -1997,7 +1786,7 @@
 </p:notes>
 </file>
 
-<file path=ppt/notesSlides/notesSlide18.xml><?xml version="1.0" encoding="utf-8"?>
+<file path=ppt/notesSlides/notesSlide16.xml><?xml version="1.0" encoding="utf-8"?>
 <p:notes xmlns:a="http://schemas.openxmlformats.org/drawingml/2006/main" xmlns:r="http://schemas.openxmlformats.org/officeDocument/2006/relationships" xmlns:p="http://schemas.openxmlformats.org/presentationml/2006/main" showMasterSp="0" showMasterPhAnim="0">
   <p:cSld>
     <p:spTree>
@@ -2101,7 +1890,7 @@
 </p:notes>
 </file>
 
-<file path=ppt/notesSlides/notesSlide19.xml><?xml version="1.0" encoding="utf-8"?>
+<file path=ppt/notesSlides/notesSlide17.xml><?xml version="1.0" encoding="utf-8"?>
 <p:notes xmlns:a="http://schemas.openxmlformats.org/drawingml/2006/main" xmlns:r="http://schemas.openxmlformats.org/officeDocument/2006/relationships" xmlns:p="http://schemas.openxmlformats.org/presentationml/2006/main" showMasterSp="0" showMasterPhAnim="0">
   <p:cSld>
     <p:spTree>
@@ -2302,118 +2091,6 @@
               <a:buNone/>
             </a:pPr>
             <a:endParaRPr/>
-          </a:p>
-        </p:txBody>
-      </p:sp>
-    </p:spTree>
-  </p:cSld>
-  <p:clrMapOvr>
-    <a:masterClrMapping/>
-  </p:clrMapOvr>
-</p:notes>
-</file>
-
-<file path=ppt/notesSlides/notesSlide20.xml><?xml version="1.0" encoding="utf-8"?>
-<p:notes xmlns:a="http://schemas.openxmlformats.org/drawingml/2006/main" xmlns:r="http://schemas.openxmlformats.org/officeDocument/2006/relationships" xmlns:p="http://schemas.openxmlformats.org/presentationml/2006/main" showMasterSp="0" showMasterPhAnim="0">
-  <p:cSld>
-    <p:spTree>
-      <p:nvGrpSpPr>
-        <p:cNvPr id="1" name="Shape 205"/>
-        <p:cNvGrpSpPr/>
-        <p:nvPr/>
-      </p:nvGrpSpPr>
-      <p:grpSpPr>
-        <a:xfrm>
-          <a:off x="0" y="0"/>
-          <a:ext cx="0" cy="0"/>
-          <a:chOff x="0" y="0"/>
-          <a:chExt cx="0" cy="0"/>
-        </a:xfrm>
-      </p:grpSpPr>
-      <p:sp>
-        <p:nvSpPr>
-          <p:cNvPr id="206" name="Google Shape;206;g9d962b619b_0_27:notes"/>
-          <p:cNvSpPr>
-            <a:spLocks noGrp="1" noRot="1" noChangeAspect="1"/>
-          </p:cNvSpPr>
-          <p:nvPr>
-            <p:ph type="sldImg" idx="2"/>
-          </p:nvPr>
-        </p:nvSpPr>
-        <p:spPr>
-          <a:xfrm>
-            <a:off x="1006475" y="685800"/>
-            <a:ext cx="4845050" cy="3429000"/>
-          </a:xfrm>
-          <a:custGeom>
-            <a:avLst/>
-            <a:gdLst/>
-            <a:ahLst/>
-            <a:cxnLst/>
-            <a:rect l="l" t="t" r="r" b="b"/>
-            <a:pathLst>
-              <a:path w="120000" h="120000" extrusionOk="0">
-                <a:moveTo>
-                  <a:pt x="0" y="0"/>
-                </a:moveTo>
-                <a:lnTo>
-                  <a:pt x="120000" y="0"/>
-                </a:lnTo>
-                <a:lnTo>
-                  <a:pt x="120000" y="120000"/>
-                </a:lnTo>
-                <a:lnTo>
-                  <a:pt x="0" y="120000"/>
-                </a:lnTo>
-                <a:close/>
-              </a:path>
-            </a:pathLst>
-          </a:custGeom>
-        </p:spPr>
-      </p:sp>
-      <p:sp>
-        <p:nvSpPr>
-          <p:cNvPr id="207" name="Google Shape;207;g9d962b619b_0_27:notes"/>
-          <p:cNvSpPr txBox="1">
-            <a:spLocks noGrp="1"/>
-          </p:cNvSpPr>
-          <p:nvPr>
-            <p:ph type="body" idx="1"/>
-          </p:nvPr>
-        </p:nvSpPr>
-        <p:spPr>
-          <a:xfrm>
-            <a:off x="914400" y="4343400"/>
-            <a:ext cx="5029200" cy="4114800"/>
-          </a:xfrm>
-          <a:prstGeom prst="rect">
-            <a:avLst/>
-          </a:prstGeom>
-        </p:spPr>
-        <p:txBody>
-          <a:bodyPr spcFirstLastPara="1" wrap="square" lIns="91425" tIns="45700" rIns="91425" bIns="45700" anchor="t" anchorCtr="0">
-            <a:noAutofit/>
-          </a:bodyPr>
-          <a:lstStyle/>
-          <a:p>
-            <a:pPr marL="0" lvl="0" indent="0" algn="l" rtl="0">
-              <a:spcBef>
-                <a:spcPts val="0"/>
-              </a:spcBef>
-              <a:spcAft>
-                <a:spcPts val="0"/>
-              </a:spcAft>
-              <a:buNone/>
-            </a:pPr>
-            <a:r>
-              <a:rPr lang="pl-PL" dirty="0"/>
-              <a:t>Show</a:t>
-            </a:r>
-            <a:r>
-              <a:rPr lang="en-GB" dirty="0"/>
-              <a:t> how to properly start conversations in MS Teams.</a:t>
-            </a:r>
-            <a:endParaRPr dirty="0"/>
           </a:p>
         </p:txBody>
       </p:sp>
@@ -34109,394 +33786,6 @@
   <p:cSld>
     <p:spTree>
       <p:nvGrpSpPr>
-        <p:cNvPr id="1" name="Shape 225"/>
-        <p:cNvGrpSpPr/>
-        <p:nvPr/>
-      </p:nvGrpSpPr>
-      <p:grpSpPr>
-        <a:xfrm>
-          <a:off x="0" y="0"/>
-          <a:ext cx="0" cy="0"/>
-          <a:chOff x="0" y="0"/>
-          <a:chExt cx="0" cy="0"/>
-        </a:xfrm>
-      </p:grpSpPr>
-      <p:sp>
-        <p:nvSpPr>
-          <p:cNvPr id="226" name="Google Shape;226;p48"/>
-          <p:cNvSpPr txBox="1">
-            <a:spLocks noGrp="1"/>
-          </p:cNvSpPr>
-          <p:nvPr>
-            <p:ph type="title"/>
-          </p:nvPr>
-        </p:nvSpPr>
-        <p:spPr>
-          <a:xfrm>
-            <a:off x="801687" y="671512"/>
-            <a:ext cx="9085200" cy="1260600"/>
-          </a:xfrm>
-          <a:prstGeom prst="rect">
-            <a:avLst/>
-          </a:prstGeom>
-        </p:spPr>
-        <p:txBody>
-          <a:bodyPr spcFirstLastPara="1" wrap="square" lIns="52125" tIns="52125" rIns="52125" bIns="52125" anchor="ctr" anchorCtr="0">
-            <a:noAutofit/>
-          </a:bodyPr>
-          <a:lstStyle/>
-          <a:p>
-            <a:pPr marL="0" lvl="0" indent="0" algn="ctr" rtl="0">
-              <a:spcBef>
-                <a:spcPts val="0"/>
-              </a:spcBef>
-              <a:spcAft>
-                <a:spcPts val="0"/>
-              </a:spcAft>
-              <a:buNone/>
-            </a:pPr>
-            <a:r>
-              <a:rPr lang="en-GB" noProof="0" dirty="0"/>
-              <a:t>Basic Rules</a:t>
-            </a:r>
-          </a:p>
-        </p:txBody>
-      </p:sp>
-      <p:sp>
-        <p:nvSpPr>
-          <p:cNvPr id="227" name="Google Shape;227;p48"/>
-          <p:cNvSpPr txBox="1">
-            <a:spLocks noGrp="1"/>
-          </p:cNvSpPr>
-          <p:nvPr>
-            <p:ph type="body" idx="1"/>
-          </p:nvPr>
-        </p:nvSpPr>
-        <p:spPr>
-          <a:xfrm>
-            <a:off x="801687" y="2184400"/>
-            <a:ext cx="9085200" cy="4538700"/>
-          </a:xfrm>
-          <a:prstGeom prst="rect">
-            <a:avLst/>
-          </a:prstGeom>
-        </p:spPr>
-        <p:txBody>
-          <a:bodyPr spcFirstLastPara="1" wrap="square" lIns="52125" tIns="52125" rIns="52125" bIns="52125" anchor="t" anchorCtr="0">
-            <a:noAutofit/>
-          </a:bodyPr>
-          <a:lstStyle/>
-          <a:p>
-            <a:pPr marL="457200" lvl="0" indent="-457200" algn="l" rtl="0">
-              <a:spcBef>
-                <a:spcPts val="800"/>
-              </a:spcBef>
-              <a:spcAft>
-                <a:spcPts val="0"/>
-              </a:spcAft>
-              <a:buSzPts val="3600"/>
-              <a:buChar char="»"/>
-            </a:pPr>
-            <a:r>
-              <a:rPr lang="en-GB" noProof="0" dirty="0"/>
-              <a:t>Each participant of the course is a pixel in the multimedia world</a:t>
-            </a:r>
-          </a:p>
-          <a:p>
-            <a:pPr marL="457200" lvl="0" indent="-457200" algn="l" rtl="0">
-              <a:spcBef>
-                <a:spcPts val="1000"/>
-              </a:spcBef>
-              <a:spcAft>
-                <a:spcPts val="0"/>
-              </a:spcAft>
-              <a:buSzPts val="3600"/>
-              <a:buChar char="»"/>
-            </a:pPr>
-            <a:r>
-              <a:rPr lang="en-GB" noProof="0" dirty="0"/>
-              <a:t>The goal of the game is to become a full-fledged, breathtaking video</a:t>
-            </a:r>
-          </a:p>
-          <a:p>
-            <a:pPr marL="457200" lvl="0" indent="-457200" algn="l" rtl="0">
-              <a:spcBef>
-                <a:spcPts val="1000"/>
-              </a:spcBef>
-              <a:spcAft>
-                <a:spcPts val="1000"/>
-              </a:spcAft>
-              <a:buSzPts val="3600"/>
-              <a:buChar char="»"/>
-            </a:pPr>
-            <a:r>
-              <a:rPr lang="en-GB" noProof="0" dirty="0"/>
-              <a:t>You can conduct your development in many ways, but the full path looks like this...</a:t>
-            </a:r>
-          </a:p>
-        </p:txBody>
-      </p:sp>
-    </p:spTree>
-  </p:cSld>
-  <p:clrMapOvr>
-    <a:masterClrMapping/>
-  </p:clrMapOvr>
-</p:sld>
-</file>
-
-<file path=ppt/slides/slide12.xml><?xml version="1.0" encoding="utf-8"?>
-<p:sld xmlns:a="http://schemas.openxmlformats.org/drawingml/2006/main" xmlns:r="http://schemas.openxmlformats.org/officeDocument/2006/relationships" xmlns:p="http://schemas.openxmlformats.org/presentationml/2006/main">
-  <p:cSld>
-    <p:spTree>
-      <p:nvGrpSpPr>
-        <p:cNvPr id="1" name="Shape 231"/>
-        <p:cNvGrpSpPr/>
-        <p:nvPr/>
-      </p:nvGrpSpPr>
-      <p:grpSpPr>
-        <a:xfrm>
-          <a:off x="0" y="0"/>
-          <a:ext cx="0" cy="0"/>
-          <a:chOff x="0" y="0"/>
-          <a:chExt cx="0" cy="0"/>
-        </a:xfrm>
-      </p:grpSpPr>
-      <p:sp>
-        <p:nvSpPr>
-          <p:cNvPr id="232" name="Google Shape;232;p49"/>
-          <p:cNvSpPr txBox="1">
-            <a:spLocks noGrp="1"/>
-          </p:cNvSpPr>
-          <p:nvPr>
-            <p:ph type="title"/>
-          </p:nvPr>
-        </p:nvSpPr>
-        <p:spPr>
-          <a:xfrm>
-            <a:off x="801687" y="671512"/>
-            <a:ext cx="9085200" cy="1260600"/>
-          </a:xfrm>
-          <a:prstGeom prst="rect">
-            <a:avLst/>
-          </a:prstGeom>
-        </p:spPr>
-        <p:txBody>
-          <a:bodyPr spcFirstLastPara="1" wrap="square" lIns="52125" tIns="52125" rIns="52125" bIns="52125" anchor="ctr" anchorCtr="0">
-            <a:noAutofit/>
-          </a:bodyPr>
-          <a:lstStyle/>
-          <a:p>
-            <a:pPr marL="0" lvl="0" indent="0" algn="ctr" rtl="0">
-              <a:spcBef>
-                <a:spcPts val="0"/>
-              </a:spcBef>
-              <a:spcAft>
-                <a:spcPts val="0"/>
-              </a:spcAft>
-              <a:buNone/>
-            </a:pPr>
-            <a:r>
-              <a:rPr lang="en-GB" noProof="0" dirty="0"/>
-              <a:t>Attributes (Badges)</a:t>
-            </a:r>
-          </a:p>
-        </p:txBody>
-      </p:sp>
-      <p:sp>
-        <p:nvSpPr>
-          <p:cNvPr id="233" name="Google Shape;233;p49"/>
-          <p:cNvSpPr txBox="1">
-            <a:spLocks noGrp="1"/>
-          </p:cNvSpPr>
-          <p:nvPr>
-            <p:ph type="body" idx="1"/>
-          </p:nvPr>
-        </p:nvSpPr>
-        <p:spPr>
-          <a:xfrm>
-            <a:off x="801687" y="2184400"/>
-            <a:ext cx="9085200" cy="4538700"/>
-          </a:xfrm>
-          <a:prstGeom prst="rect">
-            <a:avLst/>
-          </a:prstGeom>
-        </p:spPr>
-        <p:txBody>
-          <a:bodyPr spcFirstLastPara="1" wrap="square" lIns="52125" tIns="52125" rIns="52125" bIns="52125" anchor="t" anchorCtr="0">
-            <a:noAutofit/>
-          </a:bodyPr>
-          <a:lstStyle/>
-          <a:p>
-            <a:pPr marL="457200" lvl="0" indent="-419100" algn="l" rtl="0">
-              <a:lnSpc>
-                <a:spcPct val="115000"/>
-              </a:lnSpc>
-              <a:spcBef>
-                <a:spcPts val="800"/>
-              </a:spcBef>
-              <a:spcAft>
-                <a:spcPts val="0"/>
-              </a:spcAft>
-              <a:buClr>
-                <a:srgbClr val="A71930"/>
-              </a:buClr>
-              <a:buSzPts val="3000"/>
-              <a:buChar char="»"/>
-            </a:pPr>
-            <a:r>
-              <a:rPr lang="en-GB" sz="3000" b="1" noProof="0" dirty="0">
-                <a:solidFill>
-                  <a:srgbClr val="A71930"/>
-                </a:solidFill>
-              </a:rPr>
-              <a:t>Pixel (2.0)</a:t>
-            </a:r>
-          </a:p>
-          <a:p>
-            <a:pPr marL="457200" lvl="0" indent="-419100" algn="l" rtl="0">
-              <a:lnSpc>
-                <a:spcPct val="115000"/>
-              </a:lnSpc>
-              <a:spcBef>
-                <a:spcPts val="1000"/>
-              </a:spcBef>
-              <a:spcAft>
-                <a:spcPts val="0"/>
-              </a:spcAft>
-              <a:buClr>
-                <a:srgbClr val="00693C"/>
-              </a:buClr>
-              <a:buSzPts val="3000"/>
-              <a:buChar char="»"/>
-            </a:pPr>
-            <a:r>
-              <a:rPr lang="en-GB" sz="3000" b="1" noProof="0" dirty="0">
-                <a:solidFill>
-                  <a:srgbClr val="00693C"/>
-                </a:solidFill>
-              </a:rPr>
-              <a:t>Grayscale image (3.0)</a:t>
-            </a:r>
-          </a:p>
-          <a:p>
-            <a:pPr marL="457200" lvl="0" indent="-419100" algn="l" rtl="0">
-              <a:lnSpc>
-                <a:spcPct val="115000"/>
-              </a:lnSpc>
-              <a:spcBef>
-                <a:spcPts val="1000"/>
-              </a:spcBef>
-              <a:spcAft>
-                <a:spcPts val="0"/>
-              </a:spcAft>
-              <a:buClr>
-                <a:srgbClr val="00693C"/>
-              </a:buClr>
-              <a:buSzPts val="3000"/>
-              <a:buChar char="»"/>
-            </a:pPr>
-            <a:r>
-              <a:rPr lang="en-GB" sz="3000" b="1" noProof="0" dirty="0">
-                <a:solidFill>
-                  <a:srgbClr val="00693C"/>
-                </a:solidFill>
-              </a:rPr>
-              <a:t>RGB (Red Green Blue) image (3.5)</a:t>
-            </a:r>
-          </a:p>
-          <a:p>
-            <a:pPr marL="457200" lvl="0" indent="-419100" algn="l" rtl="0">
-              <a:lnSpc>
-                <a:spcPct val="115000"/>
-              </a:lnSpc>
-              <a:spcBef>
-                <a:spcPts val="1000"/>
-              </a:spcBef>
-              <a:spcAft>
-                <a:spcPts val="0"/>
-              </a:spcAft>
-              <a:buClr>
-                <a:srgbClr val="00693C"/>
-              </a:buClr>
-              <a:buSzPts val="3000"/>
-              <a:buChar char="»"/>
-            </a:pPr>
-            <a:r>
-              <a:rPr lang="en-GB" sz="3000" b="1" noProof="0" dirty="0">
-                <a:solidFill>
-                  <a:srgbClr val="00693C"/>
-                </a:solidFill>
-              </a:rPr>
-              <a:t>WCG (Wide Color Gamut) image (4.0)</a:t>
-            </a:r>
-          </a:p>
-          <a:p>
-            <a:pPr marL="457200" lvl="0" indent="-419100" algn="l" rtl="0">
-              <a:lnSpc>
-                <a:spcPct val="115000"/>
-              </a:lnSpc>
-              <a:spcBef>
-                <a:spcPts val="1000"/>
-              </a:spcBef>
-              <a:spcAft>
-                <a:spcPts val="0"/>
-              </a:spcAft>
-              <a:buClr>
-                <a:srgbClr val="00693C"/>
-              </a:buClr>
-              <a:buSzPts val="3000"/>
-              <a:buChar char="»"/>
-            </a:pPr>
-            <a:r>
-              <a:rPr lang="en-GB" sz="3000" b="1" noProof="0" dirty="0">
-                <a:solidFill>
-                  <a:srgbClr val="00693C"/>
-                </a:solidFill>
-              </a:rPr>
-              <a:t>WCG video (4.5)</a:t>
-            </a:r>
-          </a:p>
-          <a:p>
-            <a:pPr marL="457200" lvl="0" indent="-419100" algn="l" rtl="0">
-              <a:lnSpc>
-                <a:spcPct val="115000"/>
-              </a:lnSpc>
-              <a:spcBef>
-                <a:spcPts val="1000"/>
-              </a:spcBef>
-              <a:spcAft>
-                <a:spcPts val="1000"/>
-              </a:spcAft>
-              <a:buClr>
-                <a:srgbClr val="00693C"/>
-              </a:buClr>
-              <a:buSzPts val="3000"/>
-              <a:buChar char="»"/>
-            </a:pPr>
-            <a:r>
-              <a:rPr lang="en-GB" sz="3000" b="1" noProof="0" dirty="0">
-                <a:solidFill>
-                  <a:srgbClr val="00693C"/>
-                </a:solidFill>
-              </a:rPr>
-              <a:t>VR WCG video (5.0)</a:t>
-            </a:r>
-          </a:p>
-        </p:txBody>
-      </p:sp>
-    </p:spTree>
-  </p:cSld>
-  <p:clrMapOvr>
-    <a:masterClrMapping/>
-  </p:clrMapOvr>
-</p:sld>
-</file>
-
-<file path=ppt/slides/slide13.xml><?xml version="1.0" encoding="utf-8"?>
-<p:sld xmlns:a="http://schemas.openxmlformats.org/drawingml/2006/main" xmlns:r="http://schemas.openxmlformats.org/officeDocument/2006/relationships" xmlns:p="http://schemas.openxmlformats.org/presentationml/2006/main">
-  <p:cSld>
-    <p:spTree>
-      <p:nvGrpSpPr>
         <p:cNvPr id="1" name="Shape 237"/>
         <p:cNvGrpSpPr/>
         <p:nvPr/>
@@ -34643,8 +33932,8 @@
               <a:t>/</a:t>
             </a:r>
             <a:r>
-              <a:rPr lang="en-GB" sz="3000" b="1" noProof="0" dirty="0"/>
-              <a:t>18</a:t>
+              <a:rPr lang="en-GB" sz="3000" b="1" dirty="0"/>
+              <a:t>20</a:t>
             </a:r>
             <a:r>
               <a:rPr lang="en-GB" sz="3000" noProof="0" dirty="0"/>
@@ -34926,7 +34215,7 @@
 </p:sld>
 </file>
 
-<file path=ppt/slides/slide14.xml><?xml version="1.0" encoding="utf-8"?>
+<file path=ppt/slides/slide12.xml><?xml version="1.0" encoding="utf-8"?>
 <p:sld xmlns:a="http://schemas.openxmlformats.org/drawingml/2006/main" xmlns:r="http://schemas.openxmlformats.org/officeDocument/2006/relationships" xmlns:p="http://schemas.openxmlformats.org/presentationml/2006/main">
   <p:cSld>
     <p:spTree>
@@ -35127,7 +34416,7 @@
                   <a:schemeClr val="dk1"/>
                 </a:solidFill>
               </a:rPr>
-              <a:t>206</a:t>
+              <a:t>208</a:t>
             </a:r>
           </a:p>
           <a:p>
@@ -35245,7 +34534,7 @@
                   <a:srgbClr val="00693C"/>
                 </a:solidFill>
               </a:rPr>
-              <a:t>Assuming 80/168 → 100%</a:t>
+              <a:t>Assuming 80/172 → 100%</a:t>
             </a:r>
             <a:endParaRPr lang="en-GB" b="1" noProof="0" dirty="0">
               <a:solidFill>
@@ -35294,7 +34583,7 @@
 </p:sld>
 </file>
 
-<file path=ppt/slides/slide15.xml><?xml version="1.0" encoding="utf-8"?>
+<file path=ppt/slides/slide13.xml><?xml version="1.0" encoding="utf-8"?>
 <p:sld xmlns:a="http://schemas.openxmlformats.org/drawingml/2006/main" xmlns:r="http://schemas.openxmlformats.org/officeDocument/2006/relationships" xmlns:p="http://schemas.openxmlformats.org/presentationml/2006/main">
   <p:cSld>
     <p:spTree>
@@ -35347,7 +34636,7 @@
             </a:pPr>
             <a:r>
               <a:rPr lang="en-GB" noProof="0" dirty="0"/>
-              <a:t>Attributes (Badges)</a:t>
+              <a:t>Grades</a:t>
             </a:r>
           </a:p>
         </p:txBody>
@@ -35392,7 +34681,7 @@
                   <a:srgbClr val="A71930"/>
                 </a:solidFill>
               </a:rPr>
-              <a:t>Pixel (2.0)</a:t>
+              <a:t>2.0</a:t>
             </a:r>
           </a:p>
           <a:p>
@@ -35418,7 +34707,7 @@
                   <a:srgbClr val="00693C"/>
                 </a:solidFill>
               </a:rPr>
-              <a:t>Grayscale image (3.0): 50% → 41%</a:t>
+              <a:t>3.0: 50% → 41%</a:t>
             </a:r>
           </a:p>
           <a:p>
@@ -35444,7 +34733,7 @@
                   <a:srgbClr val="00693C"/>
                 </a:solidFill>
               </a:rPr>
-              <a:t>RGB (Red Green Blue) image (3.5): 60% → 49%</a:t>
+              <a:t>3.5: 60% → 50%</a:t>
             </a:r>
           </a:p>
           <a:p>
@@ -35470,7 +34759,7 @@
                   <a:srgbClr val="00693C"/>
                 </a:solidFill>
               </a:rPr>
-              <a:t>WCG (Wide Color Gamut) image (4.0): 70% → 57% </a:t>
+              <a:t>4.0: 70% → 58% </a:t>
             </a:r>
           </a:p>
           <a:p>
@@ -35496,7 +34785,7 @@
                   <a:srgbClr val="00693C"/>
                 </a:solidFill>
               </a:rPr>
-              <a:t>WCG video (4.5): 80% → 65%</a:t>
+              <a:t>4.5: 80% → 66%</a:t>
             </a:r>
           </a:p>
           <a:p>
@@ -35522,7 +34811,7 @@
                   <a:srgbClr val="00693C"/>
                 </a:solidFill>
               </a:rPr>
-              <a:t>VR WCG video (5.0): 90% → 74%</a:t>
+              <a:t>5.0: 90% → 74%</a:t>
             </a:r>
           </a:p>
         </p:txBody>
@@ -35540,7 +34829,7 @@
 </p:sld>
 </file>
 
-<file path=ppt/slides/slide16.xml><?xml version="1.0" encoding="utf-8"?>
+<file path=ppt/slides/slide14.xml><?xml version="1.0" encoding="utf-8"?>
 <p:sld xmlns:a="http://schemas.openxmlformats.org/drawingml/2006/main" xmlns:r="http://schemas.openxmlformats.org/officeDocument/2006/relationships" xmlns:p="http://schemas.openxmlformats.org/presentationml/2006/main">
   <p:cSld>
     <p:spTree>
@@ -35649,7 +34938,7 @@
 </p:sld>
 </file>
 
-<file path=ppt/slides/slide17.xml><?xml version="1.0" encoding="utf-8"?>
+<file path=ppt/slides/slide15.xml><?xml version="1.0" encoding="utf-8"?>
 <p:sld xmlns:a="http://schemas.openxmlformats.org/drawingml/2006/main" xmlns:r="http://schemas.openxmlformats.org/officeDocument/2006/relationships" xmlns:p="http://schemas.openxmlformats.org/presentationml/2006/main">
   <p:cSld>
     <p:spTree>
@@ -35762,7 +35051,7 @@
 </p:sld>
 </file>
 
-<file path=ppt/slides/slide18.xml><?xml version="1.0" encoding="utf-8"?>
+<file path=ppt/slides/slide16.xml><?xml version="1.0" encoding="utf-8"?>
 <p:sld xmlns:a="http://schemas.openxmlformats.org/drawingml/2006/main" xmlns:r="http://schemas.openxmlformats.org/officeDocument/2006/relationships" xmlns:p="http://schemas.openxmlformats.org/presentationml/2006/main">
   <p:cSld>
     <p:spTree>
@@ -35866,7 +35155,7 @@
 </p:sld>
 </file>
 
-<file path=ppt/slides/slide19.xml><?xml version="1.0" encoding="utf-8"?>
+<file path=ppt/slides/slide17.xml><?xml version="1.0" encoding="utf-8"?>
 <p:sld xmlns:a="http://schemas.openxmlformats.org/drawingml/2006/main" xmlns:r="http://schemas.openxmlformats.org/officeDocument/2006/relationships" xmlns:p="http://schemas.openxmlformats.org/presentationml/2006/main">
   <p:cSld>
     <p:spTree>
@@ -35998,7 +35287,7 @@
             </a:pPr>
             <a:fld id="{00000000-1234-1234-1234-123412341234}" type="slidenum">
               <a:rPr lang="en-GB" noProof="0" smtClean="0"/>
-              <a:t>19</a:t>
+              <a:t>17</a:t>
             </a:fld>
             <a:endParaRPr lang="en-GB" noProof="0" dirty="0"/>
           </a:p>
@@ -36105,243 +35394,6 @@
               <a:buNone/>
             </a:pPr>
             <a:endParaRPr lang="en-GB" noProof="0" dirty="0"/>
-          </a:p>
-        </p:txBody>
-      </p:sp>
-    </p:spTree>
-  </p:cSld>
-  <p:clrMapOvr>
-    <a:masterClrMapping/>
-  </p:clrMapOvr>
-</p:sld>
-</file>
-
-<file path=ppt/slides/slide20.xml><?xml version="1.0" encoding="utf-8"?>
-<p:sld xmlns:a="http://schemas.openxmlformats.org/drawingml/2006/main" xmlns:r="http://schemas.openxmlformats.org/officeDocument/2006/relationships" xmlns:p="http://schemas.openxmlformats.org/presentationml/2006/main" show="0">
-  <p:cSld>
-    <p:spTree>
-      <p:nvGrpSpPr>
-        <p:cNvPr id="1" name="Shape 208"/>
-        <p:cNvGrpSpPr/>
-        <p:nvPr/>
-      </p:nvGrpSpPr>
-      <p:grpSpPr>
-        <a:xfrm>
-          <a:off x="0" y="0"/>
-          <a:ext cx="0" cy="0"/>
-          <a:chOff x="0" y="0"/>
-          <a:chExt cx="0" cy="0"/>
-        </a:xfrm>
-      </p:grpSpPr>
-      <p:sp>
-        <p:nvSpPr>
-          <p:cNvPr id="209" name="Google Shape;209;p45"/>
-          <p:cNvSpPr txBox="1">
-            <a:spLocks noGrp="1"/>
-          </p:cNvSpPr>
-          <p:nvPr>
-            <p:ph type="title"/>
-          </p:nvPr>
-        </p:nvSpPr>
-        <p:spPr>
-          <a:xfrm>
-            <a:off x="801687" y="671512"/>
-            <a:ext cx="9085200" cy="1260600"/>
-          </a:xfrm>
-          <a:prstGeom prst="rect">
-            <a:avLst/>
-          </a:prstGeom>
-        </p:spPr>
-        <p:txBody>
-          <a:bodyPr spcFirstLastPara="1" wrap="square" lIns="52125" tIns="52125" rIns="52125" bIns="52125" anchor="ctr" anchorCtr="0">
-            <a:noAutofit/>
-          </a:bodyPr>
-          <a:lstStyle/>
-          <a:p>
-            <a:pPr marL="0" lvl="0" indent="0" algn="ctr" rtl="0">
-              <a:spcBef>
-                <a:spcPts val="0"/>
-              </a:spcBef>
-              <a:spcAft>
-                <a:spcPts val="0"/>
-              </a:spcAft>
-              <a:buNone/>
-            </a:pPr>
-            <a:r>
-              <a:rPr lang="en-GB" noProof="0" dirty="0"/>
-              <a:t>Announcements</a:t>
-            </a:r>
-            <a:br>
-              <a:rPr lang="en-GB" noProof="0" dirty="0"/>
-            </a:br>
-            <a:r>
-              <a:rPr lang="en-GB" noProof="0" dirty="0"/>
-              <a:t>and Consultations Rules</a:t>
-            </a:r>
-          </a:p>
-        </p:txBody>
-      </p:sp>
-      <p:sp>
-        <p:nvSpPr>
-          <p:cNvPr id="210" name="Google Shape;210;p45"/>
-          <p:cNvSpPr txBox="1">
-            <a:spLocks noGrp="1"/>
-          </p:cNvSpPr>
-          <p:nvPr>
-            <p:ph type="body" idx="1"/>
-          </p:nvPr>
-        </p:nvSpPr>
-        <p:spPr>
-          <a:xfrm>
-            <a:off x="801687" y="2184400"/>
-            <a:ext cx="9085200" cy="4538700"/>
-          </a:xfrm>
-          <a:prstGeom prst="rect">
-            <a:avLst/>
-          </a:prstGeom>
-        </p:spPr>
-        <p:txBody>
-          <a:bodyPr spcFirstLastPara="1" wrap="square" lIns="52125" tIns="52125" rIns="52125" bIns="52125" anchor="t" anchorCtr="0">
-            <a:noAutofit/>
-          </a:bodyPr>
-          <a:lstStyle/>
-          <a:p>
-            <a:pPr lvl="0">
-              <a:spcBef>
-                <a:spcPts val="0"/>
-              </a:spcBef>
-              <a:buClr>
-                <a:schemeClr val="dk1"/>
-              </a:buClr>
-            </a:pPr>
-            <a:r>
-              <a:rPr lang="en-GB" sz="3200" noProof="0" dirty="0">
-                <a:solidFill>
-                  <a:schemeClr val="dk1"/>
-                </a:solidFill>
-              </a:rPr>
-              <a:t>Microsoft Teams (use the code: </a:t>
-            </a:r>
-            <a:r>
-              <a:rPr lang="en-GB" sz="3200" b="1" noProof="0" dirty="0" err="1">
-                <a:solidFill>
-                  <a:schemeClr val="dk1"/>
-                </a:solidFill>
-              </a:rPr>
-              <a:t>txyjeye</a:t>
-            </a:r>
-            <a:r>
-              <a:rPr lang="en-GB" sz="3200" noProof="0" dirty="0">
-                <a:solidFill>
-                  <a:schemeClr val="dk1"/>
-                </a:solidFill>
-              </a:rPr>
-              <a:t>)</a:t>
-            </a:r>
-          </a:p>
-          <a:p>
-            <a:pPr marL="457200" lvl="0" indent="-457200" algn="l" rtl="0">
-              <a:spcBef>
-                <a:spcPts val="0"/>
-              </a:spcBef>
-              <a:spcAft>
-                <a:spcPts val="0"/>
-              </a:spcAft>
-              <a:buSzPts val="3600"/>
-              <a:buChar char="»"/>
-            </a:pPr>
-            <a:r>
-              <a:rPr lang="en-GB" sz="3200" noProof="0" dirty="0"/>
-              <a:t>Using channels:</a:t>
-            </a:r>
-          </a:p>
-          <a:p>
-            <a:pPr marL="914400" lvl="1" indent="-457200" algn="l" rtl="0">
-              <a:spcBef>
-                <a:spcPts val="0"/>
-              </a:spcBef>
-              <a:spcAft>
-                <a:spcPts val="0"/>
-              </a:spcAft>
-              <a:buSzPts val="3600"/>
-              <a:buChar char="–"/>
-            </a:pPr>
-            <a:r>
-              <a:rPr lang="en-GB" sz="3200" noProof="0" dirty="0"/>
-              <a:t>General - general topics</a:t>
-            </a:r>
-          </a:p>
-          <a:p>
-            <a:pPr marL="914400" lvl="1" indent="-457200" algn="l" rtl="0">
-              <a:spcBef>
-                <a:spcPts val="0"/>
-              </a:spcBef>
-              <a:spcAft>
-                <a:spcPts val="0"/>
-              </a:spcAft>
-              <a:buSzPts val="3600"/>
-              <a:buChar char="–"/>
-            </a:pPr>
-            <a:r>
-              <a:rPr lang="en-GB" sz="3200" noProof="0" dirty="0"/>
-              <a:t>Random - chit-chats, jokes, etc.</a:t>
-            </a:r>
-          </a:p>
-          <a:p>
-            <a:pPr marL="914400" lvl="1" indent="-457200" algn="l" rtl="0">
-              <a:spcBef>
-                <a:spcPts val="0"/>
-              </a:spcBef>
-              <a:spcAft>
-                <a:spcPts val="0"/>
-              </a:spcAft>
-              <a:buSzPts val="3600"/>
-              <a:buChar char="–"/>
-            </a:pPr>
-            <a:r>
-              <a:rPr lang="en-GB" sz="3200" noProof="0" dirty="0"/>
-              <a:t>Course-year (e.g., </a:t>
-            </a:r>
-            <a:r>
-              <a:rPr lang="en-GB" sz="3200" i="1" noProof="0" dirty="0"/>
-              <a:t>MIPaC-2021</a:t>
-            </a:r>
-            <a:r>
-              <a:rPr lang="en-GB" sz="3200" noProof="0" dirty="0"/>
-              <a:t>) – course related matters</a:t>
-            </a:r>
-          </a:p>
-          <a:p>
-            <a:pPr marL="457200" lvl="0" indent="-457200" algn="l" rtl="0">
-              <a:spcBef>
-                <a:spcPts val="0"/>
-              </a:spcBef>
-              <a:spcAft>
-                <a:spcPts val="0"/>
-              </a:spcAft>
-              <a:buSzPts val="3600"/>
-              <a:buChar char="»"/>
-            </a:pPr>
-            <a:r>
-              <a:rPr lang="en-GB" sz="3200" noProof="0" dirty="0"/>
-              <a:t>Avoid direct messages in problem-solving - share the knowledge</a:t>
-            </a:r>
-          </a:p>
-          <a:p>
-            <a:pPr marL="457200" lvl="0" indent="-457200" algn="l" rtl="0">
-              <a:spcBef>
-                <a:spcPts val="0"/>
-              </a:spcBef>
-              <a:spcAft>
-                <a:spcPts val="0"/>
-              </a:spcAft>
-              <a:buSzPts val="3600"/>
-              <a:buChar char="»"/>
-            </a:pPr>
-            <a:r>
-              <a:rPr lang="en-GB" sz="3200" noProof="0" dirty="0"/>
-              <a:t>Use [Issue Titles] and threads</a:t>
-            </a:r>
           </a:p>
         </p:txBody>
       </p:sp>
@@ -36867,7 +35919,7 @@
                   <a:schemeClr val="dk1"/>
                 </a:solidFill>
               </a:rPr>
-              <a:t>Quizzes (TBC)</a:t>
+              <a:t>Quizzes</a:t>
             </a:r>
           </a:p>
         </p:txBody>

</xml_diff>